<commit_message>
updated gitignore to keep slides out.
</commit_message>
<xml_diff>
--- a/DotnetInteropSlides.pptx
+++ b/DotnetInteropSlides.pptx
@@ -9,6 +9,7 @@
     <p:sldId id="258" r:id="rId3"/>
     <p:sldId id="257" r:id="rId4"/>
     <p:sldId id="259" r:id="rId5"/>
+    <p:sldId id="260" r:id="rId6"/>
   </p:sldIdLst>
   <p:sldSz cx="12192000" cy="6858000"/>
   <p:notesSz cx="6858000" cy="9144000"/>
@@ -5518,6 +5519,149 @@
 </p:sld>
 </file>
 
+<file path=ppt/slides/slide5.xml><?xml version="1.0" encoding="utf-8"?>
+<p:sld xmlns:a="http://schemas.openxmlformats.org/drawingml/2006/main" xmlns:r="http://schemas.openxmlformats.org/officeDocument/2006/relationships" xmlns:p="http://schemas.openxmlformats.org/presentationml/2006/main">
+  <p:cSld>
+    <p:spTree>
+      <p:nvGrpSpPr>
+        <p:cNvPr id="1" name=""/>
+        <p:cNvGrpSpPr/>
+        <p:nvPr/>
+      </p:nvGrpSpPr>
+      <p:grpSpPr>
+        <a:xfrm>
+          <a:off x="0" y="0"/>
+          <a:ext cx="0" cy="0"/>
+          <a:chOff x="0" y="0"/>
+          <a:chExt cx="0" cy="0"/>
+        </a:xfrm>
+      </p:grpSpPr>
+      <p:sp>
+        <p:nvSpPr>
+          <p:cNvPr id="4" name="Rectangle 3">
+            <a:extLst>
+              <a:ext uri="{FF2B5EF4-FFF2-40B4-BE49-F238E27FC236}">
+                <a16:creationId xmlns:a16="http://schemas.microsoft.com/office/drawing/2014/main" id="{2058D325-366B-47E5-934D-FC405F65C783}"/>
+              </a:ext>
+            </a:extLst>
+          </p:cNvPr>
+          <p:cNvSpPr/>
+          <p:nvPr/>
+        </p:nvSpPr>
+        <p:spPr>
+          <a:xfrm>
+            <a:off x="1605255" y="189171"/>
+            <a:ext cx="8404866" cy="1323439"/>
+          </a:xfrm>
+          <a:prstGeom prst="rect">
+            <a:avLst/>
+          </a:prstGeom>
+          <a:noFill/>
+        </p:spPr>
+        <p:txBody>
+          <a:bodyPr wrap="none" lIns="91440" tIns="45720" rIns="91440" bIns="45720">
+            <a:spAutoFit/>
+          </a:bodyPr>
+          <a:lstStyle/>
+          <a:p>
+            <a:pPr algn="ctr"/>
+            <a:r>
+              <a:rPr lang="en-US" sz="8000" b="1" cap="none" spc="0" dirty="0">
+                <a:ln w="9525">
+                  <a:solidFill>
+                    <a:schemeClr val="bg1"/>
+                  </a:solidFill>
+                  <a:prstDash val="solid"/>
+                </a:ln>
+                <a:solidFill>
+                  <a:schemeClr val="tx1"/>
+                </a:solidFill>
+                <a:effectLst>
+                  <a:outerShdw blurRad="12700" dist="38100" dir="2700000" algn="tl" rotWithShape="0">
+                    <a:schemeClr val="bg1">
+                      <a:lumMod val="50000"/>
+                    </a:schemeClr>
+                  </a:outerShdw>
+                </a:effectLst>
+              </a:rPr>
+              <a:t>Visual Basic And C#</a:t>
+            </a:r>
+          </a:p>
+        </p:txBody>
+      </p:sp>
+      <p:pic>
+        <p:nvPicPr>
+          <p:cNvPr id="6" name="Picture 5">
+            <a:extLst>
+              <a:ext uri="{FF2B5EF4-FFF2-40B4-BE49-F238E27FC236}">
+                <a16:creationId xmlns:a16="http://schemas.microsoft.com/office/drawing/2014/main" id="{86FBAEB3-BE97-471A-BD88-47AB08F4A5EC}"/>
+              </a:ext>
+            </a:extLst>
+          </p:cNvPr>
+          <p:cNvPicPr>
+            <a:picLocks noChangeAspect="1"/>
+          </p:cNvPicPr>
+          <p:nvPr/>
+        </p:nvPicPr>
+        <p:blipFill>
+          <a:blip r:embed="rId2"/>
+          <a:stretch>
+            <a:fillRect/>
+          </a:stretch>
+        </p:blipFill>
+        <p:spPr>
+          <a:xfrm>
+            <a:off x="261792" y="2022694"/>
+            <a:ext cx="5203362" cy="3990928"/>
+          </a:xfrm>
+          <a:prstGeom prst="rect">
+            <a:avLst/>
+          </a:prstGeom>
+        </p:spPr>
+      </p:pic>
+      <p:pic>
+        <p:nvPicPr>
+          <p:cNvPr id="7" name="Picture 6">
+            <a:extLst>
+              <a:ext uri="{FF2B5EF4-FFF2-40B4-BE49-F238E27FC236}">
+                <a16:creationId xmlns:a16="http://schemas.microsoft.com/office/drawing/2014/main" id="{C0FF720A-0676-41C0-A754-2E4F95C6F11C}"/>
+              </a:ext>
+            </a:extLst>
+          </p:cNvPr>
+          <p:cNvPicPr>
+            <a:picLocks noChangeAspect="1"/>
+          </p:cNvPicPr>
+          <p:nvPr/>
+        </p:nvPicPr>
+        <p:blipFill>
+          <a:blip r:embed="rId3"/>
+          <a:stretch>
+            <a:fillRect/>
+          </a:stretch>
+        </p:blipFill>
+        <p:spPr>
+          <a:xfrm>
+            <a:off x="5606469" y="2162737"/>
+            <a:ext cx="6204513" cy="3669652"/>
+          </a:xfrm>
+          <a:prstGeom prst="rect">
+            <a:avLst/>
+          </a:prstGeom>
+        </p:spPr>
+      </p:pic>
+    </p:spTree>
+    <p:extLst>
+      <p:ext uri="{BB962C8B-B14F-4D97-AF65-F5344CB8AC3E}">
+        <p14:creationId xmlns:p14="http://schemas.microsoft.com/office/powerpoint/2010/main" val="3849683184"/>
+      </p:ext>
+    </p:extLst>
+  </p:cSld>
+  <p:clrMapOvr>
+    <a:masterClrMapping/>
+  </p:clrMapOvr>
+</p:sld>
+</file>
+
 <file path=ppt/theme/theme1.xml><?xml version="1.0" encoding="utf-8"?>
 <a:theme xmlns:a="http://schemas.openxmlformats.org/drawingml/2006/main" name="Office Theme">
   <a:themeElements>

</xml_diff>

<commit_message>
Further updates to slides and code.
</commit_message>
<xml_diff>
--- a/DotnetInteropSlides.pptx
+++ b/DotnetInteropSlides.pptx
@@ -8,8 +8,14 @@
     <p:sldId id="256" r:id="rId2"/>
     <p:sldId id="258" r:id="rId3"/>
     <p:sldId id="257" r:id="rId4"/>
-    <p:sldId id="259" r:id="rId5"/>
-    <p:sldId id="260" r:id="rId6"/>
+    <p:sldId id="261" r:id="rId5"/>
+    <p:sldId id="259" r:id="rId6"/>
+    <p:sldId id="260" r:id="rId7"/>
+    <p:sldId id="262" r:id="rId8"/>
+    <p:sldId id="263" r:id="rId9"/>
+    <p:sldId id="264" r:id="rId10"/>
+    <p:sldId id="265" r:id="rId11"/>
+    <p:sldId id="266" r:id="rId12"/>
   </p:sldIdLst>
   <p:sldSz cx="12192000" cy="6858000"/>
   <p:notesSz cx="6858000" cy="9144000"/>
@@ -265,7 +271,7 @@
           <a:p>
             <a:fld id="{79BF1C55-0641-464C-A9F1-827E4E83AD03}" type="datetimeFigureOut">
               <a:rPr lang="en-GB" smtClean="0"/>
-              <a:t>04/03/2020</a:t>
+              <a:t>08/04/2020</a:t>
             </a:fld>
             <a:endParaRPr lang="en-GB"/>
           </a:p>
@@ -465,7 +471,7 @@
           <a:p>
             <a:fld id="{79BF1C55-0641-464C-A9F1-827E4E83AD03}" type="datetimeFigureOut">
               <a:rPr lang="en-GB" smtClean="0"/>
-              <a:t>04/03/2020</a:t>
+              <a:t>08/04/2020</a:t>
             </a:fld>
             <a:endParaRPr lang="en-GB"/>
           </a:p>
@@ -675,7 +681,7 @@
           <a:p>
             <a:fld id="{79BF1C55-0641-464C-A9F1-827E4E83AD03}" type="datetimeFigureOut">
               <a:rPr lang="en-GB" smtClean="0"/>
-              <a:t>04/03/2020</a:t>
+              <a:t>08/04/2020</a:t>
             </a:fld>
             <a:endParaRPr lang="en-GB"/>
           </a:p>
@@ -875,7 +881,7 @@
           <a:p>
             <a:fld id="{79BF1C55-0641-464C-A9F1-827E4E83AD03}" type="datetimeFigureOut">
               <a:rPr lang="en-GB" smtClean="0"/>
-              <a:t>04/03/2020</a:t>
+              <a:t>08/04/2020</a:t>
             </a:fld>
             <a:endParaRPr lang="en-GB"/>
           </a:p>
@@ -1151,7 +1157,7 @@
           <a:p>
             <a:fld id="{79BF1C55-0641-464C-A9F1-827E4E83AD03}" type="datetimeFigureOut">
               <a:rPr lang="en-GB" smtClean="0"/>
-              <a:t>04/03/2020</a:t>
+              <a:t>08/04/2020</a:t>
             </a:fld>
             <a:endParaRPr lang="en-GB"/>
           </a:p>
@@ -1419,7 +1425,7 @@
           <a:p>
             <a:fld id="{79BF1C55-0641-464C-A9F1-827E4E83AD03}" type="datetimeFigureOut">
               <a:rPr lang="en-GB" smtClean="0"/>
-              <a:t>04/03/2020</a:t>
+              <a:t>08/04/2020</a:t>
             </a:fld>
             <a:endParaRPr lang="en-GB"/>
           </a:p>
@@ -1834,7 +1840,7 @@
           <a:p>
             <a:fld id="{79BF1C55-0641-464C-A9F1-827E4E83AD03}" type="datetimeFigureOut">
               <a:rPr lang="en-GB" smtClean="0"/>
-              <a:t>04/03/2020</a:t>
+              <a:t>08/04/2020</a:t>
             </a:fld>
             <a:endParaRPr lang="en-GB"/>
           </a:p>
@@ -1976,7 +1982,7 @@
           <a:p>
             <a:fld id="{79BF1C55-0641-464C-A9F1-827E4E83AD03}" type="datetimeFigureOut">
               <a:rPr lang="en-GB" smtClean="0"/>
-              <a:t>04/03/2020</a:t>
+              <a:t>08/04/2020</a:t>
             </a:fld>
             <a:endParaRPr lang="en-GB"/>
           </a:p>
@@ -2089,7 +2095,7 @@
           <a:p>
             <a:fld id="{79BF1C55-0641-464C-A9F1-827E4E83AD03}" type="datetimeFigureOut">
               <a:rPr lang="en-GB" smtClean="0"/>
-              <a:t>04/03/2020</a:t>
+              <a:t>08/04/2020</a:t>
             </a:fld>
             <a:endParaRPr lang="en-GB"/>
           </a:p>
@@ -2402,7 +2408,7 @@
           <a:p>
             <a:fld id="{79BF1C55-0641-464C-A9F1-827E4E83AD03}" type="datetimeFigureOut">
               <a:rPr lang="en-GB" smtClean="0"/>
-              <a:t>04/03/2020</a:t>
+              <a:t>08/04/2020</a:t>
             </a:fld>
             <a:endParaRPr lang="en-GB"/>
           </a:p>
@@ -2691,7 +2697,7 @@
           <a:p>
             <a:fld id="{79BF1C55-0641-464C-A9F1-827E4E83AD03}" type="datetimeFigureOut">
               <a:rPr lang="en-GB" smtClean="0"/>
-              <a:t>04/03/2020</a:t>
+              <a:t>08/04/2020</a:t>
             </a:fld>
             <a:endParaRPr lang="en-GB"/>
           </a:p>
@@ -2934,7 +2940,7 @@
           <a:p>
             <a:fld id="{79BF1C55-0641-464C-A9F1-827E4E83AD03}" type="datetimeFigureOut">
               <a:rPr lang="en-GB" smtClean="0"/>
-              <a:t>04/03/2020</a:t>
+              <a:t>08/04/2020</a:t>
             </a:fld>
             <a:endParaRPr lang="en-GB"/>
           </a:p>
@@ -3767,6 +3773,424 @@
 </p:sld>
 </file>
 
+<file path=ppt/slides/slide10.xml><?xml version="1.0" encoding="utf-8"?>
+<p:sld xmlns:a="http://schemas.openxmlformats.org/drawingml/2006/main" xmlns:r="http://schemas.openxmlformats.org/officeDocument/2006/relationships" xmlns:p="http://schemas.openxmlformats.org/presentationml/2006/main">
+  <p:cSld>
+    <p:spTree>
+      <p:nvGrpSpPr>
+        <p:cNvPr id="1" name=""/>
+        <p:cNvGrpSpPr/>
+        <p:nvPr/>
+      </p:nvGrpSpPr>
+      <p:grpSpPr>
+        <a:xfrm>
+          <a:off x="0" y="0"/>
+          <a:ext cx="0" cy="0"/>
+          <a:chOff x="0" y="0"/>
+          <a:chExt cx="0" cy="0"/>
+        </a:xfrm>
+      </p:grpSpPr>
+      <p:sp>
+        <p:nvSpPr>
+          <p:cNvPr id="4" name="Rectangle 3">
+            <a:extLst>
+              <a:ext uri="{FF2B5EF4-FFF2-40B4-BE49-F238E27FC236}">
+                <a16:creationId xmlns:a16="http://schemas.microsoft.com/office/drawing/2014/main" id="{2058D325-366B-47E5-934D-FC405F65C783}"/>
+              </a:ext>
+            </a:extLst>
+          </p:cNvPr>
+          <p:cNvSpPr/>
+          <p:nvPr/>
+        </p:nvSpPr>
+        <p:spPr>
+          <a:xfrm>
+            <a:off x="1975405" y="234049"/>
+            <a:ext cx="8403904" cy="1323439"/>
+          </a:xfrm>
+          <a:prstGeom prst="rect">
+            <a:avLst/>
+          </a:prstGeom>
+          <a:noFill/>
+        </p:spPr>
+        <p:txBody>
+          <a:bodyPr wrap="none" lIns="91440" tIns="45720" rIns="91440" bIns="45720">
+            <a:spAutoFit/>
+          </a:bodyPr>
+          <a:lstStyle/>
+          <a:p>
+            <a:pPr algn="ctr"/>
+            <a:r>
+              <a:rPr lang="en-US" sz="8000" b="1" cap="none" spc="0" dirty="0">
+                <a:ln w="9525">
+                  <a:solidFill>
+                    <a:schemeClr val="bg1"/>
+                  </a:solidFill>
+                  <a:prstDash val="solid"/>
+                </a:ln>
+                <a:solidFill>
+                  <a:schemeClr val="tx1"/>
+                </a:solidFill>
+                <a:effectLst>
+                  <a:outerShdw blurRad="12700" dist="38100" dir="2700000" algn="tl" rotWithShape="0">
+                    <a:schemeClr val="bg1">
+                      <a:lumMod val="50000"/>
+                    </a:schemeClr>
+                  </a:outerShdw>
+                </a:effectLst>
+              </a:rPr>
+              <a:t>Values and Records</a:t>
+            </a:r>
+          </a:p>
+        </p:txBody>
+      </p:sp>
+      <p:sp>
+        <p:nvSpPr>
+          <p:cNvPr id="5" name="Content Placeholder 2">
+            <a:extLst>
+              <a:ext uri="{FF2B5EF4-FFF2-40B4-BE49-F238E27FC236}">
+                <a16:creationId xmlns:a16="http://schemas.microsoft.com/office/drawing/2014/main" id="{93B4D857-0A6D-4657-913A-56C62D4776A0}"/>
+              </a:ext>
+            </a:extLst>
+          </p:cNvPr>
+          <p:cNvSpPr>
+            <a:spLocks noGrp="1"/>
+          </p:cNvSpPr>
+          <p:nvPr>
+            <p:ph idx="1"/>
+          </p:nvPr>
+        </p:nvSpPr>
+        <p:spPr>
+          <a:xfrm>
+            <a:off x="-729574" y="1625863"/>
+            <a:ext cx="5126476" cy="3606274"/>
+          </a:xfrm>
+        </p:spPr>
+        <p:txBody>
+          <a:bodyPr>
+            <a:noAutofit/>
+          </a:bodyPr>
+          <a:lstStyle/>
+          <a:p>
+            <a:pPr lvl="2"/>
+            <a:r>
+              <a:rPr lang="en-GB" sz="3200" dirty="0"/>
+              <a:t>Values are exposed as static fields on  class.</a:t>
+            </a:r>
+          </a:p>
+          <a:p>
+            <a:pPr lvl="2"/>
+            <a:endParaRPr lang="en-GB" sz="3200" dirty="0"/>
+          </a:p>
+          <a:p>
+            <a:pPr lvl="2"/>
+            <a:r>
+              <a:rPr lang="en-GB" sz="3200" dirty="0"/>
+              <a:t>Records generate a read-only class with only a full parameter constructor.</a:t>
+            </a:r>
+          </a:p>
+          <a:p>
+            <a:pPr lvl="2"/>
+            <a:endParaRPr lang="en-GB" sz="3200" dirty="0"/>
+          </a:p>
+        </p:txBody>
+      </p:sp>
+      <p:pic>
+        <p:nvPicPr>
+          <p:cNvPr id="2" name="Picture 1">
+            <a:extLst>
+              <a:ext uri="{FF2B5EF4-FFF2-40B4-BE49-F238E27FC236}">
+                <a16:creationId xmlns:a16="http://schemas.microsoft.com/office/drawing/2014/main" id="{759D3D28-171C-4D42-B424-DA8D1EC4AB01}"/>
+              </a:ext>
+            </a:extLst>
+          </p:cNvPr>
+          <p:cNvPicPr>
+            <a:picLocks noChangeAspect="1"/>
+          </p:cNvPicPr>
+          <p:nvPr/>
+        </p:nvPicPr>
+        <p:blipFill>
+          <a:blip r:embed="rId2"/>
+          <a:stretch>
+            <a:fillRect/>
+          </a:stretch>
+        </p:blipFill>
+        <p:spPr>
+          <a:xfrm>
+            <a:off x="6651286" y="1844735"/>
+            <a:ext cx="3416841" cy="905463"/>
+          </a:xfrm>
+          <a:prstGeom prst="rect">
+            <a:avLst/>
+          </a:prstGeom>
+        </p:spPr>
+      </p:pic>
+      <p:pic>
+        <p:nvPicPr>
+          <p:cNvPr id="8" name="Picture 7">
+            <a:extLst>
+              <a:ext uri="{FF2B5EF4-FFF2-40B4-BE49-F238E27FC236}">
+                <a16:creationId xmlns:a16="http://schemas.microsoft.com/office/drawing/2014/main" id="{7E885B59-839A-477C-A6CD-3AA240D5BA89}"/>
+              </a:ext>
+            </a:extLst>
+          </p:cNvPr>
+          <p:cNvPicPr>
+            <a:picLocks noChangeAspect="1"/>
+          </p:cNvPicPr>
+          <p:nvPr/>
+        </p:nvPicPr>
+        <p:blipFill>
+          <a:blip r:embed="rId3"/>
+          <a:stretch>
+            <a:fillRect/>
+          </a:stretch>
+        </p:blipFill>
+        <p:spPr>
+          <a:xfrm>
+            <a:off x="5920091" y="3714345"/>
+            <a:ext cx="5276444" cy="603022"/>
+          </a:xfrm>
+          <a:prstGeom prst="rect">
+            <a:avLst/>
+          </a:prstGeom>
+        </p:spPr>
+      </p:pic>
+    </p:spTree>
+    <p:extLst>
+      <p:ext uri="{BB962C8B-B14F-4D97-AF65-F5344CB8AC3E}">
+        <p14:creationId xmlns:p14="http://schemas.microsoft.com/office/powerpoint/2010/main" val="2969026266"/>
+      </p:ext>
+    </p:extLst>
+  </p:cSld>
+  <p:clrMapOvr>
+    <a:masterClrMapping/>
+  </p:clrMapOvr>
+</p:sld>
+</file>
+
+<file path=ppt/slides/slide11.xml><?xml version="1.0" encoding="utf-8"?>
+<p:sld xmlns:a="http://schemas.openxmlformats.org/drawingml/2006/main" xmlns:r="http://schemas.openxmlformats.org/officeDocument/2006/relationships" xmlns:p="http://schemas.openxmlformats.org/presentationml/2006/main">
+  <p:cSld>
+    <p:spTree>
+      <p:nvGrpSpPr>
+        <p:cNvPr id="1" name=""/>
+        <p:cNvGrpSpPr/>
+        <p:nvPr/>
+      </p:nvGrpSpPr>
+      <p:grpSpPr>
+        <a:xfrm>
+          <a:off x="0" y="0"/>
+          <a:ext cx="0" cy="0"/>
+          <a:chOff x="0" y="0"/>
+          <a:chExt cx="0" cy="0"/>
+        </a:xfrm>
+      </p:grpSpPr>
+      <p:sp>
+        <p:nvSpPr>
+          <p:cNvPr id="4" name="Rectangle 3">
+            <a:extLst>
+              <a:ext uri="{FF2B5EF4-FFF2-40B4-BE49-F238E27FC236}">
+                <a16:creationId xmlns:a16="http://schemas.microsoft.com/office/drawing/2014/main" id="{2058D325-366B-47E5-934D-FC405F65C783}"/>
+              </a:ext>
+            </a:extLst>
+          </p:cNvPr>
+          <p:cNvSpPr/>
+          <p:nvPr/>
+        </p:nvSpPr>
+        <p:spPr>
+          <a:xfrm>
+            <a:off x="1975405" y="234049"/>
+            <a:ext cx="8403904" cy="1323439"/>
+          </a:xfrm>
+          <a:prstGeom prst="rect">
+            <a:avLst/>
+          </a:prstGeom>
+          <a:noFill/>
+        </p:spPr>
+        <p:txBody>
+          <a:bodyPr wrap="none" lIns="91440" tIns="45720" rIns="91440" bIns="45720">
+            <a:spAutoFit/>
+          </a:bodyPr>
+          <a:lstStyle/>
+          <a:p>
+            <a:pPr algn="ctr"/>
+            <a:r>
+              <a:rPr lang="en-US" sz="8000" b="1" cap="none" spc="0" dirty="0">
+                <a:ln w="9525">
+                  <a:solidFill>
+                    <a:schemeClr val="bg1"/>
+                  </a:solidFill>
+                  <a:prstDash val="solid"/>
+                </a:ln>
+                <a:solidFill>
+                  <a:schemeClr val="tx1"/>
+                </a:solidFill>
+                <a:effectLst>
+                  <a:outerShdw blurRad="12700" dist="38100" dir="2700000" algn="tl" rotWithShape="0">
+                    <a:schemeClr val="bg1">
+                      <a:lumMod val="50000"/>
+                    </a:schemeClr>
+                  </a:outerShdw>
+                </a:effectLst>
+              </a:rPr>
+              <a:t>Values and Records</a:t>
+            </a:r>
+          </a:p>
+        </p:txBody>
+      </p:sp>
+      <p:sp>
+        <p:nvSpPr>
+          <p:cNvPr id="5" name="Content Placeholder 2">
+            <a:extLst>
+              <a:ext uri="{FF2B5EF4-FFF2-40B4-BE49-F238E27FC236}">
+                <a16:creationId xmlns:a16="http://schemas.microsoft.com/office/drawing/2014/main" id="{93B4D857-0A6D-4657-913A-56C62D4776A0}"/>
+              </a:ext>
+            </a:extLst>
+          </p:cNvPr>
+          <p:cNvSpPr>
+            <a:spLocks noGrp="1"/>
+          </p:cNvSpPr>
+          <p:nvPr>
+            <p:ph idx="1"/>
+          </p:nvPr>
+        </p:nvSpPr>
+        <p:spPr>
+          <a:xfrm>
+            <a:off x="-729574" y="1625863"/>
+            <a:ext cx="5126476" cy="3606274"/>
+          </a:xfrm>
+        </p:spPr>
+        <p:txBody>
+          <a:bodyPr>
+            <a:noAutofit/>
+          </a:bodyPr>
+          <a:lstStyle/>
+          <a:p>
+            <a:pPr lvl="2"/>
+            <a:r>
+              <a:rPr lang="en-GB" sz="3200" dirty="0"/>
+              <a:t>Values are exposed as static fields on  class.</a:t>
+            </a:r>
+          </a:p>
+          <a:p>
+            <a:pPr lvl="2"/>
+            <a:endParaRPr lang="en-GB" sz="3200" dirty="0"/>
+          </a:p>
+          <a:p>
+            <a:pPr lvl="2"/>
+            <a:r>
+              <a:rPr lang="en-GB" sz="3200" dirty="0"/>
+              <a:t>Records generate a read-only class with only a full parameter constructor.</a:t>
+            </a:r>
+          </a:p>
+          <a:p>
+            <a:pPr lvl="2"/>
+            <a:endParaRPr lang="en-GB" sz="3200" dirty="0"/>
+          </a:p>
+        </p:txBody>
+      </p:sp>
+      <p:pic>
+        <p:nvPicPr>
+          <p:cNvPr id="3" name="Picture 2">
+            <a:extLst>
+              <a:ext uri="{FF2B5EF4-FFF2-40B4-BE49-F238E27FC236}">
+                <a16:creationId xmlns:a16="http://schemas.microsoft.com/office/drawing/2014/main" id="{1950EBB2-25EB-40FC-A63F-42A9D17CD6F1}"/>
+              </a:ext>
+            </a:extLst>
+          </p:cNvPr>
+          <p:cNvPicPr>
+            <a:picLocks noChangeAspect="1"/>
+          </p:cNvPicPr>
+          <p:nvPr/>
+        </p:nvPicPr>
+        <p:blipFill>
+          <a:blip r:embed="rId2"/>
+          <a:stretch>
+            <a:fillRect/>
+          </a:stretch>
+        </p:blipFill>
+        <p:spPr>
+          <a:xfrm>
+            <a:off x="7069170" y="1445901"/>
+            <a:ext cx="2784947" cy="1463518"/>
+          </a:xfrm>
+          <a:prstGeom prst="rect">
+            <a:avLst/>
+          </a:prstGeom>
+        </p:spPr>
+      </p:pic>
+      <p:pic>
+        <p:nvPicPr>
+          <p:cNvPr id="6" name="Picture 5">
+            <a:extLst>
+              <a:ext uri="{FF2B5EF4-FFF2-40B4-BE49-F238E27FC236}">
+                <a16:creationId xmlns:a16="http://schemas.microsoft.com/office/drawing/2014/main" id="{7EB7C355-EB6A-403E-932E-990207D9AFAB}"/>
+              </a:ext>
+            </a:extLst>
+          </p:cNvPr>
+          <p:cNvPicPr>
+            <a:picLocks noChangeAspect="1"/>
+          </p:cNvPicPr>
+          <p:nvPr/>
+        </p:nvPicPr>
+        <p:blipFill>
+          <a:blip r:embed="rId3"/>
+          <a:stretch>
+            <a:fillRect/>
+          </a:stretch>
+        </p:blipFill>
+        <p:spPr>
+          <a:xfrm>
+            <a:off x="5879050" y="3006859"/>
+            <a:ext cx="5604286" cy="422141"/>
+          </a:xfrm>
+          <a:prstGeom prst="rect">
+            <a:avLst/>
+          </a:prstGeom>
+        </p:spPr>
+      </p:pic>
+      <p:pic>
+        <p:nvPicPr>
+          <p:cNvPr id="7" name="Picture 6">
+            <a:extLst>
+              <a:ext uri="{FF2B5EF4-FFF2-40B4-BE49-F238E27FC236}">
+                <a16:creationId xmlns:a16="http://schemas.microsoft.com/office/drawing/2014/main" id="{AC38F9FE-B1FF-4B46-B47C-84FDFB2086B8}"/>
+              </a:ext>
+            </a:extLst>
+          </p:cNvPr>
+          <p:cNvPicPr>
+            <a:picLocks noChangeAspect="1"/>
+          </p:cNvPicPr>
+          <p:nvPr/>
+        </p:nvPicPr>
+        <p:blipFill>
+          <a:blip r:embed="rId4"/>
+          <a:stretch>
+            <a:fillRect/>
+          </a:stretch>
+        </p:blipFill>
+        <p:spPr>
+          <a:xfrm>
+            <a:off x="4396902" y="3773491"/>
+            <a:ext cx="7600545" cy="2355098"/>
+          </a:xfrm>
+          <a:prstGeom prst="rect">
+            <a:avLst/>
+          </a:prstGeom>
+        </p:spPr>
+      </p:pic>
+    </p:spTree>
+    <p:extLst>
+      <p:ext uri="{BB962C8B-B14F-4D97-AF65-F5344CB8AC3E}">
+        <p14:creationId xmlns:p14="http://schemas.microsoft.com/office/powerpoint/2010/main" val="903686768"/>
+      </p:ext>
+    </p:extLst>
+  </p:cSld>
+  <p:clrMapOvr>
+    <a:masterClrMapping/>
+  </p:clrMapOvr>
+</p:sld>
+</file>
+
 <file path=ppt/slides/slide2.xml><?xml version="1.0" encoding="utf-8"?>
 <p:sld xmlns:a="http://schemas.openxmlformats.org/drawingml/2006/main" xmlns:r="http://schemas.openxmlformats.org/officeDocument/2006/relationships" xmlns:p="http://schemas.openxmlformats.org/presentationml/2006/main">
   <p:cSld>
@@ -5002,6 +5426,164 @@
 </file>
 
 <file path=ppt/slides/slide4.xml><?xml version="1.0" encoding="utf-8"?>
+<p:sld xmlns:a="http://schemas.openxmlformats.org/drawingml/2006/main" xmlns:r="http://schemas.openxmlformats.org/officeDocument/2006/relationships" xmlns:p="http://schemas.openxmlformats.org/presentationml/2006/main">
+  <p:cSld>
+    <p:spTree>
+      <p:nvGrpSpPr>
+        <p:cNvPr id="1" name=""/>
+        <p:cNvGrpSpPr/>
+        <p:nvPr/>
+      </p:nvGrpSpPr>
+      <p:grpSpPr>
+        <a:xfrm>
+          <a:off x="0" y="0"/>
+          <a:ext cx="0" cy="0"/>
+          <a:chOff x="0" y="0"/>
+          <a:chExt cx="0" cy="0"/>
+        </a:xfrm>
+      </p:grpSpPr>
+      <p:sp>
+        <p:nvSpPr>
+          <p:cNvPr id="3" name="Content Placeholder 2">
+            <a:extLst>
+              <a:ext uri="{FF2B5EF4-FFF2-40B4-BE49-F238E27FC236}">
+                <a16:creationId xmlns:a16="http://schemas.microsoft.com/office/drawing/2014/main" id="{D0347BAD-57EC-4F0D-A4AD-8748F172EEBA}"/>
+              </a:ext>
+            </a:extLst>
+          </p:cNvPr>
+          <p:cNvSpPr>
+            <a:spLocks noGrp="1"/>
+          </p:cNvSpPr>
+          <p:nvPr>
+            <p:ph idx="1"/>
+          </p:nvPr>
+        </p:nvSpPr>
+        <p:spPr>
+          <a:xfrm>
+            <a:off x="478962" y="1413198"/>
+            <a:ext cx="11474740" cy="1733121"/>
+          </a:xfrm>
+        </p:spPr>
+        <p:txBody>
+          <a:bodyPr>
+            <a:noAutofit/>
+          </a:bodyPr>
+          <a:lstStyle/>
+          <a:p>
+            <a:r>
+              <a:rPr lang="en-GB" sz="3200" dirty="0"/>
+              <a:t>Quick look at the work ‘Interoperability’</a:t>
+            </a:r>
+          </a:p>
+          <a:p>
+            <a:r>
+              <a:rPr lang="en-GB" sz="3200" dirty="0"/>
+              <a:t>Object-Oriented to Object-Oriented</a:t>
+            </a:r>
+          </a:p>
+          <a:p>
+            <a:pPr lvl="1"/>
+            <a:r>
+              <a:rPr lang="en-GB" sz="3200" dirty="0"/>
+              <a:t>Featuring C# and Visual Basic</a:t>
+            </a:r>
+          </a:p>
+          <a:p>
+            <a:r>
+              <a:rPr lang="en-GB" sz="3200" dirty="0"/>
+              <a:t>Object-Oriented – Function</a:t>
+            </a:r>
+          </a:p>
+          <a:p>
+            <a:pPr lvl="1"/>
+            <a:r>
+              <a:rPr lang="en-GB" sz="3200" dirty="0"/>
+              <a:t>Featuring C# and F#</a:t>
+            </a:r>
+          </a:p>
+          <a:p>
+            <a:pPr lvl="2"/>
+            <a:r>
+              <a:rPr lang="en-GB" sz="3200" dirty="0"/>
+              <a:t>When it Works well</a:t>
+            </a:r>
+          </a:p>
+          <a:p>
+            <a:pPr lvl="2"/>
+            <a:r>
+              <a:rPr lang="en-GB" sz="3200" dirty="0"/>
+              <a:t>When it doesn't work well (more often than you might think)</a:t>
+            </a:r>
+          </a:p>
+        </p:txBody>
+      </p:sp>
+      <p:sp>
+        <p:nvSpPr>
+          <p:cNvPr id="9" name="Rectangle 8">
+            <a:extLst>
+              <a:ext uri="{FF2B5EF4-FFF2-40B4-BE49-F238E27FC236}">
+                <a16:creationId xmlns:a16="http://schemas.microsoft.com/office/drawing/2014/main" id="{2837FD89-8E05-4E67-B9A6-85F44A9BA7CF}"/>
+              </a:ext>
+            </a:extLst>
+          </p:cNvPr>
+          <p:cNvSpPr/>
+          <p:nvPr/>
+        </p:nvSpPr>
+        <p:spPr>
+          <a:xfrm>
+            <a:off x="1728812" y="189171"/>
+            <a:ext cx="8157746" cy="1323439"/>
+          </a:xfrm>
+          <a:prstGeom prst="rect">
+            <a:avLst/>
+          </a:prstGeom>
+          <a:noFill/>
+        </p:spPr>
+        <p:txBody>
+          <a:bodyPr wrap="none" lIns="91440" tIns="45720" rIns="91440" bIns="45720">
+            <a:spAutoFit/>
+          </a:bodyPr>
+          <a:lstStyle/>
+          <a:p>
+            <a:pPr algn="ctr"/>
+            <a:r>
+              <a:rPr lang="en-US" sz="8000" b="1" cap="none" spc="0" dirty="0">
+                <a:ln w="9525">
+                  <a:solidFill>
+                    <a:schemeClr val="bg1"/>
+                  </a:solidFill>
+                  <a:prstDash val="solid"/>
+                </a:ln>
+                <a:solidFill>
+                  <a:schemeClr val="tx1"/>
+                </a:solidFill>
+                <a:effectLst>
+                  <a:outerShdw blurRad="12700" dist="38100" dir="2700000" algn="tl" rotWithShape="0">
+                    <a:schemeClr val="bg1">
+                      <a:lumMod val="50000"/>
+                    </a:schemeClr>
+                  </a:outerShdw>
+                </a:effectLst>
+              </a:rPr>
+              <a:t>What’s in the talk?</a:t>
+            </a:r>
+          </a:p>
+        </p:txBody>
+      </p:sp>
+    </p:spTree>
+    <p:extLst>
+      <p:ext uri="{BB962C8B-B14F-4D97-AF65-F5344CB8AC3E}">
+        <p14:creationId xmlns:p14="http://schemas.microsoft.com/office/powerpoint/2010/main" val="3690855383"/>
+      </p:ext>
+    </p:extLst>
+  </p:cSld>
+  <p:clrMapOvr>
+    <a:masterClrMapping/>
+  </p:clrMapOvr>
+</p:sld>
+</file>
+
+<file path=ppt/slides/slide5.xml><?xml version="1.0" encoding="utf-8"?>
 <p:sld xmlns:a="http://schemas.openxmlformats.org/drawingml/2006/main" xmlns:r="http://schemas.openxmlformats.org/officeDocument/2006/relationships" xmlns:p="http://schemas.openxmlformats.org/presentationml/2006/main">
   <p:cSld>
     <p:spTree>
@@ -5524,7 +6106,7 @@
 </p:sld>
 </file>
 
-<file path=ppt/slides/slide5.xml><?xml version="1.0" encoding="utf-8"?>
+<file path=ppt/slides/slide6.xml><?xml version="1.0" encoding="utf-8"?>
 <p:sld xmlns:a="http://schemas.openxmlformats.org/drawingml/2006/main" xmlns:r="http://schemas.openxmlformats.org/officeDocument/2006/relationships" xmlns:p="http://schemas.openxmlformats.org/presentationml/2006/main">
   <p:cSld>
     <p:spTree>
@@ -5658,6 +6240,574 @@
     <p:extLst>
       <p:ext uri="{BB962C8B-B14F-4D97-AF65-F5344CB8AC3E}">
         <p14:creationId xmlns:p14="http://schemas.microsoft.com/office/powerpoint/2010/main" val="3849683184"/>
+      </p:ext>
+    </p:extLst>
+  </p:cSld>
+  <p:clrMapOvr>
+    <a:masterClrMapping/>
+  </p:clrMapOvr>
+</p:sld>
+</file>
+
+<file path=ppt/slides/slide7.xml><?xml version="1.0" encoding="utf-8"?>
+<p:sld xmlns:a="http://schemas.openxmlformats.org/drawingml/2006/main" xmlns:r="http://schemas.openxmlformats.org/officeDocument/2006/relationships" xmlns:p="http://schemas.openxmlformats.org/presentationml/2006/main">
+  <p:cSld>
+    <p:spTree>
+      <p:nvGrpSpPr>
+        <p:cNvPr id="1" name=""/>
+        <p:cNvGrpSpPr/>
+        <p:nvPr/>
+      </p:nvGrpSpPr>
+      <p:grpSpPr>
+        <a:xfrm>
+          <a:off x="0" y="0"/>
+          <a:ext cx="0" cy="0"/>
+          <a:chOff x="0" y="0"/>
+          <a:chExt cx="0" cy="0"/>
+        </a:xfrm>
+      </p:grpSpPr>
+      <p:sp>
+        <p:nvSpPr>
+          <p:cNvPr id="4" name="Rectangle 3">
+            <a:extLst>
+              <a:ext uri="{FF2B5EF4-FFF2-40B4-BE49-F238E27FC236}">
+                <a16:creationId xmlns:a16="http://schemas.microsoft.com/office/drawing/2014/main" id="{2058D325-366B-47E5-934D-FC405F65C783}"/>
+              </a:ext>
+            </a:extLst>
+          </p:cNvPr>
+          <p:cNvSpPr/>
+          <p:nvPr/>
+        </p:nvSpPr>
+        <p:spPr>
+          <a:xfrm>
+            <a:off x="1498596" y="189171"/>
+            <a:ext cx="8618193" cy="1323439"/>
+          </a:xfrm>
+          <a:prstGeom prst="rect">
+            <a:avLst/>
+          </a:prstGeom>
+          <a:noFill/>
+        </p:spPr>
+        <p:txBody>
+          <a:bodyPr wrap="none" lIns="91440" tIns="45720" rIns="91440" bIns="45720">
+            <a:spAutoFit/>
+          </a:bodyPr>
+          <a:lstStyle/>
+          <a:p>
+            <a:pPr algn="ctr"/>
+            <a:r>
+              <a:rPr lang="en-US" sz="8000" b="1" cap="none" spc="0" dirty="0">
+                <a:ln w="9525">
+                  <a:solidFill>
+                    <a:schemeClr val="bg1"/>
+                  </a:solidFill>
+                  <a:prstDash val="solid"/>
+                </a:ln>
+                <a:solidFill>
+                  <a:schemeClr val="tx1"/>
+                </a:solidFill>
+                <a:effectLst>
+                  <a:outerShdw blurRad="12700" dist="38100" dir="2700000" algn="tl" rotWithShape="0">
+                    <a:schemeClr val="bg1">
+                      <a:lumMod val="50000"/>
+                    </a:schemeClr>
+                  </a:outerShdw>
+                </a:effectLst>
+              </a:rPr>
+              <a:t>But what About F#?</a:t>
+            </a:r>
+          </a:p>
+        </p:txBody>
+      </p:sp>
+      <p:sp>
+        <p:nvSpPr>
+          <p:cNvPr id="5" name="Content Placeholder 2">
+            <a:extLst>
+              <a:ext uri="{FF2B5EF4-FFF2-40B4-BE49-F238E27FC236}">
+                <a16:creationId xmlns:a16="http://schemas.microsoft.com/office/drawing/2014/main" id="{93B4D857-0A6D-4657-913A-56C62D4776A0}"/>
+              </a:ext>
+            </a:extLst>
+          </p:cNvPr>
+          <p:cNvSpPr>
+            <a:spLocks noGrp="1"/>
+          </p:cNvSpPr>
+          <p:nvPr>
+            <p:ph idx="1"/>
+          </p:nvPr>
+        </p:nvSpPr>
+        <p:spPr>
+          <a:xfrm>
+            <a:off x="116732" y="2181683"/>
+            <a:ext cx="5369668" cy="3606274"/>
+          </a:xfrm>
+        </p:spPr>
+        <p:txBody>
+          <a:bodyPr>
+            <a:noAutofit/>
+          </a:bodyPr>
+          <a:lstStyle/>
+          <a:p>
+            <a:pPr lvl="2"/>
+            <a:r>
+              <a:rPr lang="en-GB" sz="3200" dirty="0"/>
+              <a:t>Discriminated Unions</a:t>
+            </a:r>
+          </a:p>
+          <a:p>
+            <a:pPr lvl="2"/>
+            <a:r>
+              <a:rPr lang="en-GB" sz="3200" dirty="0"/>
+              <a:t>Options</a:t>
+            </a:r>
+          </a:p>
+          <a:p>
+            <a:pPr lvl="2"/>
+            <a:r>
+              <a:rPr lang="en-GB" sz="3200" dirty="0"/>
+              <a:t>Higher Order Functions</a:t>
+            </a:r>
+          </a:p>
+          <a:p>
+            <a:pPr lvl="2"/>
+            <a:r>
+              <a:rPr lang="en-GB" sz="3200" dirty="0"/>
+              <a:t>Modules</a:t>
+            </a:r>
+          </a:p>
+          <a:p>
+            <a:pPr lvl="2"/>
+            <a:r>
+              <a:rPr lang="en-GB" sz="3200" dirty="0"/>
+              <a:t>Records</a:t>
+            </a:r>
+          </a:p>
+          <a:p>
+            <a:pPr lvl="2"/>
+            <a:r>
+              <a:rPr lang="en-GB" sz="3200" dirty="0"/>
+              <a:t>Sequences</a:t>
+            </a:r>
+          </a:p>
+          <a:p>
+            <a:pPr lvl="2"/>
+            <a:endParaRPr lang="en-GB" sz="3200" dirty="0"/>
+          </a:p>
+        </p:txBody>
+      </p:sp>
+      <p:pic>
+        <p:nvPicPr>
+          <p:cNvPr id="1030" name="Picture 6" descr="Lambda : définition de LAMBDA, subst. masc. | La langue française">
+            <a:extLst>
+              <a:ext uri="{FF2B5EF4-FFF2-40B4-BE49-F238E27FC236}">
+                <a16:creationId xmlns:a16="http://schemas.microsoft.com/office/drawing/2014/main" id="{A57F312A-5CB3-4156-BF49-89D3D2F9C422}"/>
+              </a:ext>
+            </a:extLst>
+          </p:cNvPr>
+          <p:cNvPicPr>
+            <a:picLocks noChangeAspect="1" noChangeArrowheads="1"/>
+          </p:cNvPicPr>
+          <p:nvPr/>
+        </p:nvPicPr>
+        <p:blipFill>
+          <a:blip r:embed="rId2">
+            <a:clrChange>
+              <a:clrFrom>
+                <a:srgbClr val="FEFEFE"/>
+              </a:clrFrom>
+              <a:clrTo>
+                <a:srgbClr val="FEFEFE">
+                  <a:alpha val="0"/>
+                </a:srgbClr>
+              </a:clrTo>
+            </a:clrChange>
+            <a:extLst>
+              <a:ext uri="{28A0092B-C50C-407E-A947-70E740481C1C}">
+                <a14:useLocalDpi xmlns:a14="http://schemas.microsoft.com/office/drawing/2010/main" val="0"/>
+              </a:ext>
+            </a:extLst>
+          </a:blip>
+          <a:srcRect/>
+          <a:stretch>
+            <a:fillRect/>
+          </a:stretch>
+        </p:blipFill>
+        <p:spPr bwMode="auto">
+          <a:xfrm>
+            <a:off x="8710789" y="2374796"/>
+            <a:ext cx="3481211" cy="3481211"/>
+          </a:xfrm>
+          <a:prstGeom prst="rect">
+            <a:avLst/>
+          </a:prstGeom>
+          <a:noFill/>
+          <a:extLst>
+            <a:ext uri="{909E8E84-426E-40DD-AFC4-6F175D3DCCD1}">
+              <a14:hiddenFill xmlns:a14="http://schemas.microsoft.com/office/drawing/2010/main">
+                <a:solidFill>
+                  <a:srgbClr val="FFFFFF"/>
+                </a:solidFill>
+              </a14:hiddenFill>
+            </a:ext>
+          </a:extLst>
+        </p:spPr>
+      </p:pic>
+      <p:pic>
+        <p:nvPicPr>
+          <p:cNvPr id="10" name="Picture 4" descr="See the source image">
+            <a:extLst>
+              <a:ext uri="{FF2B5EF4-FFF2-40B4-BE49-F238E27FC236}">
+                <a16:creationId xmlns:a16="http://schemas.microsoft.com/office/drawing/2014/main" id="{9B24F4E8-37F9-4884-8E59-66EEF82494C9}"/>
+              </a:ext>
+            </a:extLst>
+          </p:cNvPr>
+          <p:cNvPicPr>
+            <a:picLocks noChangeAspect="1" noChangeArrowheads="1"/>
+          </p:cNvPicPr>
+          <p:nvPr/>
+        </p:nvPicPr>
+        <p:blipFill>
+          <a:blip r:embed="rId3">
+            <a:extLst>
+              <a:ext uri="{28A0092B-C50C-407E-A947-70E740481C1C}">
+                <a14:useLocalDpi xmlns:a14="http://schemas.microsoft.com/office/drawing/2010/main" val="0"/>
+              </a:ext>
+            </a:extLst>
+          </a:blip>
+          <a:srcRect/>
+          <a:stretch>
+            <a:fillRect/>
+          </a:stretch>
+        </p:blipFill>
+        <p:spPr bwMode="auto">
+          <a:xfrm>
+            <a:off x="5688799" y="2271070"/>
+            <a:ext cx="3688665" cy="3688665"/>
+          </a:xfrm>
+          <a:prstGeom prst="rect">
+            <a:avLst/>
+          </a:prstGeom>
+          <a:noFill/>
+          <a:extLst>
+            <a:ext uri="{909E8E84-426E-40DD-AFC4-6F175D3DCCD1}">
+              <a14:hiddenFill xmlns:a14="http://schemas.microsoft.com/office/drawing/2010/main">
+                <a:solidFill>
+                  <a:srgbClr val="FFFFFF"/>
+                </a:solidFill>
+              </a14:hiddenFill>
+            </a:ext>
+          </a:extLst>
+        </p:spPr>
+      </p:pic>
+    </p:spTree>
+    <p:extLst>
+      <p:ext uri="{BB962C8B-B14F-4D97-AF65-F5344CB8AC3E}">
+        <p14:creationId xmlns:p14="http://schemas.microsoft.com/office/powerpoint/2010/main" val="3229354030"/>
+      </p:ext>
+    </p:extLst>
+  </p:cSld>
+  <p:clrMapOvr>
+    <a:masterClrMapping/>
+  </p:clrMapOvr>
+</p:sld>
+</file>
+
+<file path=ppt/slides/slide8.xml><?xml version="1.0" encoding="utf-8"?>
+<p:sld xmlns:a="http://schemas.openxmlformats.org/drawingml/2006/main" xmlns:r="http://schemas.openxmlformats.org/officeDocument/2006/relationships" xmlns:p="http://schemas.openxmlformats.org/presentationml/2006/main">
+  <p:cSld>
+    <p:spTree>
+      <p:nvGrpSpPr>
+        <p:cNvPr id="1" name=""/>
+        <p:cNvGrpSpPr/>
+        <p:nvPr/>
+      </p:nvGrpSpPr>
+      <p:grpSpPr>
+        <a:xfrm>
+          <a:off x="0" y="0"/>
+          <a:ext cx="0" cy="0"/>
+          <a:chOff x="0" y="0"/>
+          <a:chExt cx="0" cy="0"/>
+        </a:xfrm>
+      </p:grpSpPr>
+      <p:sp>
+        <p:nvSpPr>
+          <p:cNvPr id="4" name="Rectangle 3">
+            <a:extLst>
+              <a:ext uri="{FF2B5EF4-FFF2-40B4-BE49-F238E27FC236}">
+                <a16:creationId xmlns:a16="http://schemas.microsoft.com/office/drawing/2014/main" id="{2058D325-366B-47E5-934D-FC405F65C783}"/>
+              </a:ext>
+            </a:extLst>
+          </p:cNvPr>
+          <p:cNvSpPr/>
+          <p:nvPr/>
+        </p:nvSpPr>
+        <p:spPr>
+          <a:xfrm>
+            <a:off x="3523062" y="2151727"/>
+            <a:ext cx="4956214" cy="2554545"/>
+          </a:xfrm>
+          <a:prstGeom prst="rect">
+            <a:avLst/>
+          </a:prstGeom>
+          <a:noFill/>
+        </p:spPr>
+        <p:txBody>
+          <a:bodyPr wrap="square" lIns="91440" tIns="45720" rIns="91440" bIns="45720">
+            <a:spAutoFit/>
+          </a:bodyPr>
+          <a:lstStyle/>
+          <a:p>
+            <a:pPr algn="ctr"/>
+            <a:r>
+              <a:rPr lang="en-US" sz="8000" b="1" cap="none" spc="0" dirty="0">
+                <a:ln w="9525">
+                  <a:solidFill>
+                    <a:schemeClr val="bg1"/>
+                  </a:solidFill>
+                  <a:prstDash val="solid"/>
+                </a:ln>
+                <a:solidFill>
+                  <a:schemeClr val="tx1"/>
+                </a:solidFill>
+                <a:effectLst>
+                  <a:outerShdw blurRad="12700" dist="38100" dir="2700000" algn="tl" rotWithShape="0">
+                    <a:schemeClr val="bg1">
+                      <a:lumMod val="50000"/>
+                    </a:schemeClr>
+                  </a:outerShdw>
+                </a:effectLst>
+              </a:rPr>
+              <a:t>Things that work well</a:t>
+            </a:r>
+          </a:p>
+        </p:txBody>
+      </p:sp>
+    </p:spTree>
+    <p:extLst>
+      <p:ext uri="{BB962C8B-B14F-4D97-AF65-F5344CB8AC3E}">
+        <p14:creationId xmlns:p14="http://schemas.microsoft.com/office/powerpoint/2010/main" val="1020875565"/>
+      </p:ext>
+    </p:extLst>
+  </p:cSld>
+  <p:clrMapOvr>
+    <a:masterClrMapping/>
+  </p:clrMapOvr>
+</p:sld>
+</file>
+
+<file path=ppt/slides/slide9.xml><?xml version="1.0" encoding="utf-8"?>
+<p:sld xmlns:a="http://schemas.openxmlformats.org/drawingml/2006/main" xmlns:r="http://schemas.openxmlformats.org/officeDocument/2006/relationships" xmlns:p="http://schemas.openxmlformats.org/presentationml/2006/main">
+  <p:cSld>
+    <p:spTree>
+      <p:nvGrpSpPr>
+        <p:cNvPr id="1" name=""/>
+        <p:cNvGrpSpPr/>
+        <p:nvPr/>
+      </p:nvGrpSpPr>
+      <p:grpSpPr>
+        <a:xfrm>
+          <a:off x="0" y="0"/>
+          <a:ext cx="0" cy="0"/>
+          <a:chOff x="0" y="0"/>
+          <a:chExt cx="0" cy="0"/>
+        </a:xfrm>
+      </p:grpSpPr>
+      <p:sp>
+        <p:nvSpPr>
+          <p:cNvPr id="4" name="Rectangle 3">
+            <a:extLst>
+              <a:ext uri="{FF2B5EF4-FFF2-40B4-BE49-F238E27FC236}">
+                <a16:creationId xmlns:a16="http://schemas.microsoft.com/office/drawing/2014/main" id="{2058D325-366B-47E5-934D-FC405F65C783}"/>
+              </a:ext>
+            </a:extLst>
+          </p:cNvPr>
+          <p:cNvSpPr/>
+          <p:nvPr/>
+        </p:nvSpPr>
+        <p:spPr>
+          <a:xfrm>
+            <a:off x="510575" y="234049"/>
+            <a:ext cx="11333552" cy="1323439"/>
+          </a:xfrm>
+          <a:prstGeom prst="rect">
+            <a:avLst/>
+          </a:prstGeom>
+          <a:noFill/>
+        </p:spPr>
+        <p:txBody>
+          <a:bodyPr wrap="none" lIns="91440" tIns="45720" rIns="91440" bIns="45720">
+            <a:spAutoFit/>
+          </a:bodyPr>
+          <a:lstStyle/>
+          <a:p>
+            <a:pPr algn="ctr"/>
+            <a:r>
+              <a:rPr lang="en-US" sz="8000" b="1" cap="none" spc="0" dirty="0">
+                <a:ln w="9525">
+                  <a:solidFill>
+                    <a:schemeClr val="bg1"/>
+                  </a:solidFill>
+                  <a:prstDash val="solid"/>
+                </a:ln>
+                <a:solidFill>
+                  <a:schemeClr val="tx1"/>
+                </a:solidFill>
+                <a:effectLst>
+                  <a:outerShdw blurRad="12700" dist="38100" dir="2700000" algn="tl" rotWithShape="0">
+                    <a:schemeClr val="bg1">
+                      <a:lumMod val="50000"/>
+                    </a:schemeClr>
+                  </a:outerShdw>
+                </a:effectLst>
+              </a:rPr>
+              <a:t>Namespaces and Modules</a:t>
+            </a:r>
+          </a:p>
+        </p:txBody>
+      </p:sp>
+      <p:sp>
+        <p:nvSpPr>
+          <p:cNvPr id="5" name="Content Placeholder 2">
+            <a:extLst>
+              <a:ext uri="{FF2B5EF4-FFF2-40B4-BE49-F238E27FC236}">
+                <a16:creationId xmlns:a16="http://schemas.microsoft.com/office/drawing/2014/main" id="{93B4D857-0A6D-4657-913A-56C62D4776A0}"/>
+              </a:ext>
+            </a:extLst>
+          </p:cNvPr>
+          <p:cNvSpPr>
+            <a:spLocks noGrp="1"/>
+          </p:cNvSpPr>
+          <p:nvPr>
+            <p:ph idx="1"/>
+          </p:nvPr>
+        </p:nvSpPr>
+        <p:spPr>
+          <a:xfrm>
+            <a:off x="-729574" y="1625863"/>
+            <a:ext cx="4717914" cy="3606274"/>
+          </a:xfrm>
+        </p:spPr>
+        <p:txBody>
+          <a:bodyPr>
+            <a:noAutofit/>
+          </a:bodyPr>
+          <a:lstStyle/>
+          <a:p>
+            <a:pPr lvl="2"/>
+            <a:r>
+              <a:rPr lang="en-GB" sz="3200" dirty="0"/>
+              <a:t>Namespaces allow using statements just like C# namespaces</a:t>
+            </a:r>
+          </a:p>
+          <a:p>
+            <a:pPr lvl="2"/>
+            <a:endParaRPr lang="en-GB" sz="3200" dirty="0"/>
+          </a:p>
+          <a:p>
+            <a:pPr lvl="2"/>
+            <a:r>
+              <a:rPr lang="en-GB" sz="3200" dirty="0"/>
+              <a:t>Modules Expose themselves as Static Classes</a:t>
+            </a:r>
+          </a:p>
+          <a:p>
+            <a:pPr lvl="2"/>
+            <a:endParaRPr lang="en-GB" sz="3200" dirty="0"/>
+          </a:p>
+        </p:txBody>
+      </p:sp>
+      <p:pic>
+        <p:nvPicPr>
+          <p:cNvPr id="3" name="Picture 2">
+            <a:extLst>
+              <a:ext uri="{FF2B5EF4-FFF2-40B4-BE49-F238E27FC236}">
+                <a16:creationId xmlns:a16="http://schemas.microsoft.com/office/drawing/2014/main" id="{7611B0C6-5475-4C27-BCFF-BF594A697476}"/>
+              </a:ext>
+            </a:extLst>
+          </p:cNvPr>
+          <p:cNvPicPr>
+            <a:picLocks noChangeAspect="1"/>
+          </p:cNvPicPr>
+          <p:nvPr/>
+        </p:nvPicPr>
+        <p:blipFill rotWithShape="1">
+          <a:blip r:embed="rId2"/>
+          <a:srcRect t="4039"/>
+          <a:stretch/>
+        </p:blipFill>
+        <p:spPr>
+          <a:xfrm>
+            <a:off x="5855038" y="1625863"/>
+            <a:ext cx="5370681" cy="1413125"/>
+          </a:xfrm>
+          <a:prstGeom prst="rect">
+            <a:avLst/>
+          </a:prstGeom>
+        </p:spPr>
+      </p:pic>
+      <p:pic>
+        <p:nvPicPr>
+          <p:cNvPr id="6" name="Picture 5">
+            <a:extLst>
+              <a:ext uri="{FF2B5EF4-FFF2-40B4-BE49-F238E27FC236}">
+                <a16:creationId xmlns:a16="http://schemas.microsoft.com/office/drawing/2014/main" id="{C750D4A5-3499-44BE-A5EF-841DAE1CD9C7}"/>
+              </a:ext>
+            </a:extLst>
+          </p:cNvPr>
+          <p:cNvPicPr>
+            <a:picLocks noChangeAspect="1"/>
+          </p:cNvPicPr>
+          <p:nvPr/>
+        </p:nvPicPr>
+        <p:blipFill>
+          <a:blip r:embed="rId3"/>
+          <a:stretch>
+            <a:fillRect/>
+          </a:stretch>
+        </p:blipFill>
+        <p:spPr>
+          <a:xfrm>
+            <a:off x="4804652" y="4260715"/>
+            <a:ext cx="7246790" cy="479567"/>
+          </a:xfrm>
+          <a:prstGeom prst="rect">
+            <a:avLst/>
+          </a:prstGeom>
+        </p:spPr>
+      </p:pic>
+      <p:pic>
+        <p:nvPicPr>
+          <p:cNvPr id="7" name="Picture 6">
+            <a:extLst>
+              <a:ext uri="{FF2B5EF4-FFF2-40B4-BE49-F238E27FC236}">
+                <a16:creationId xmlns:a16="http://schemas.microsoft.com/office/drawing/2014/main" id="{13AD465A-72BD-4332-8A53-D002499417A8}"/>
+              </a:ext>
+            </a:extLst>
+          </p:cNvPr>
+          <p:cNvPicPr>
+            <a:picLocks noChangeAspect="1"/>
+          </p:cNvPicPr>
+          <p:nvPr/>
+        </p:nvPicPr>
+        <p:blipFill>
+          <a:blip r:embed="rId4"/>
+          <a:stretch>
+            <a:fillRect/>
+          </a:stretch>
+        </p:blipFill>
+        <p:spPr>
+          <a:xfrm>
+            <a:off x="6636695" y="3338107"/>
+            <a:ext cx="3828971" cy="377859"/>
+          </a:xfrm>
+          <a:prstGeom prst="rect">
+            <a:avLst/>
+          </a:prstGeom>
+        </p:spPr>
+      </p:pic>
+    </p:spTree>
+    <p:extLst>
+      <p:ext uri="{BB962C8B-B14F-4D97-AF65-F5344CB8AC3E}">
+        <p14:creationId xmlns:p14="http://schemas.microsoft.com/office/powerpoint/2010/main" val="2067629608"/>
       </p:ext>
     </p:extLst>
   </p:cSld>

</xml_diff>

<commit_message>
More work on slides and adding slide code to main code.
</commit_message>
<xml_diff>
--- a/DotnetInteropSlides.pptx
+++ b/DotnetInteropSlides.pptx
@@ -16,6 +16,8 @@
     <p:sldId id="264" r:id="rId10"/>
     <p:sldId id="265" r:id="rId11"/>
     <p:sldId id="266" r:id="rId12"/>
+    <p:sldId id="267" r:id="rId13"/>
+    <p:sldId id="268" r:id="rId14"/>
   </p:sldIdLst>
   <p:sldSz cx="12192000" cy="6858000"/>
   <p:notesSz cx="6858000" cy="9144000"/>
@@ -4191,6 +4193,478 @@
 </p:sld>
 </file>
 
+<file path=ppt/slides/slide12.xml><?xml version="1.0" encoding="utf-8"?>
+<p:sld xmlns:a="http://schemas.openxmlformats.org/drawingml/2006/main" xmlns:r="http://schemas.openxmlformats.org/officeDocument/2006/relationships" xmlns:p="http://schemas.openxmlformats.org/presentationml/2006/main">
+  <p:cSld>
+    <p:spTree>
+      <p:nvGrpSpPr>
+        <p:cNvPr id="1" name=""/>
+        <p:cNvGrpSpPr/>
+        <p:nvPr/>
+      </p:nvGrpSpPr>
+      <p:grpSpPr>
+        <a:xfrm>
+          <a:off x="0" y="0"/>
+          <a:ext cx="0" cy="0"/>
+          <a:chOff x="0" y="0"/>
+          <a:chExt cx="0" cy="0"/>
+        </a:xfrm>
+      </p:grpSpPr>
+      <p:sp>
+        <p:nvSpPr>
+          <p:cNvPr id="4" name="Rectangle 3">
+            <a:extLst>
+              <a:ext uri="{FF2B5EF4-FFF2-40B4-BE49-F238E27FC236}">
+                <a16:creationId xmlns:a16="http://schemas.microsoft.com/office/drawing/2014/main" id="{2058D325-366B-47E5-934D-FC405F65C783}"/>
+              </a:ext>
+            </a:extLst>
+          </p:cNvPr>
+          <p:cNvSpPr/>
+          <p:nvPr/>
+        </p:nvSpPr>
+        <p:spPr>
+          <a:xfrm>
+            <a:off x="1949152" y="234049"/>
+            <a:ext cx="8456419" cy="1323439"/>
+          </a:xfrm>
+          <a:prstGeom prst="rect">
+            <a:avLst/>
+          </a:prstGeom>
+          <a:noFill/>
+        </p:spPr>
+        <p:txBody>
+          <a:bodyPr wrap="none" lIns="91440" tIns="45720" rIns="91440" bIns="45720">
+            <a:spAutoFit/>
+          </a:bodyPr>
+          <a:lstStyle/>
+          <a:p>
+            <a:pPr algn="ctr"/>
+            <a:r>
+              <a:rPr lang="en-US" sz="8000" b="1" cap="none" spc="0" dirty="0">
+                <a:ln w="9525">
+                  <a:solidFill>
+                    <a:schemeClr val="bg1"/>
+                  </a:solidFill>
+                  <a:prstDash val="solid"/>
+                </a:ln>
+                <a:solidFill>
+                  <a:schemeClr val="tx1"/>
+                </a:solidFill>
+                <a:effectLst>
+                  <a:outerShdw blurRad="12700" dist="38100" dir="2700000" algn="tl" rotWithShape="0">
+                    <a:schemeClr val="bg1">
+                      <a:lumMod val="50000"/>
+                    </a:schemeClr>
+                  </a:outerShdw>
+                </a:effectLst>
+              </a:rPr>
+              <a:t>Seq, Array and Lists</a:t>
+            </a:r>
+          </a:p>
+        </p:txBody>
+      </p:sp>
+      <p:sp>
+        <p:nvSpPr>
+          <p:cNvPr id="5" name="Content Placeholder 2">
+            <a:extLst>
+              <a:ext uri="{FF2B5EF4-FFF2-40B4-BE49-F238E27FC236}">
+                <a16:creationId xmlns:a16="http://schemas.microsoft.com/office/drawing/2014/main" id="{93B4D857-0A6D-4657-913A-56C62D4776A0}"/>
+              </a:ext>
+            </a:extLst>
+          </p:cNvPr>
+          <p:cNvSpPr>
+            <a:spLocks noGrp="1"/>
+          </p:cNvSpPr>
+          <p:nvPr>
+            <p:ph idx="1"/>
+          </p:nvPr>
+        </p:nvSpPr>
+        <p:spPr>
+          <a:xfrm>
+            <a:off x="-729574" y="1625863"/>
+            <a:ext cx="5126476" cy="3606274"/>
+          </a:xfrm>
+        </p:spPr>
+        <p:txBody>
+          <a:bodyPr>
+            <a:noAutofit/>
+          </a:bodyPr>
+          <a:lstStyle/>
+          <a:p>
+            <a:pPr lvl="2"/>
+            <a:r>
+              <a:rPr lang="en-GB" sz="3200" dirty="0"/>
+              <a:t>Arrays work as expected</a:t>
+            </a:r>
+          </a:p>
+          <a:p>
+            <a:pPr lvl="2"/>
+            <a:endParaRPr lang="en-GB" sz="3200" dirty="0"/>
+          </a:p>
+          <a:p>
+            <a:pPr lvl="2"/>
+            <a:r>
+              <a:rPr lang="en-GB" sz="3200" dirty="0" err="1"/>
+              <a:t>Seq</a:t>
+            </a:r>
+            <a:r>
+              <a:rPr lang="en-GB" sz="3200" dirty="0"/>
+              <a:t> get exposed as </a:t>
+            </a:r>
+            <a:r>
+              <a:rPr lang="en-GB" sz="3200" dirty="0" err="1"/>
+              <a:t>IEnumerable</a:t>
+            </a:r>
+            <a:endParaRPr lang="en-GB" sz="3200" dirty="0"/>
+          </a:p>
+          <a:p>
+            <a:pPr marL="914400" lvl="2" indent="0">
+              <a:buNone/>
+            </a:pPr>
+            <a:endParaRPr lang="en-GB" sz="3200" dirty="0"/>
+          </a:p>
+          <a:p>
+            <a:pPr lvl="2"/>
+            <a:r>
+              <a:rPr lang="en-GB" sz="3200" dirty="0"/>
+              <a:t>Lists are a separate type  (</a:t>
+            </a:r>
+            <a:r>
+              <a:rPr lang="en-GB" sz="3200" dirty="0" err="1"/>
+              <a:t>FSharpList</a:t>
+            </a:r>
+            <a:r>
+              <a:rPr lang="en-GB" sz="3200" dirty="0"/>
+              <a:t>) but implement the </a:t>
+            </a:r>
+            <a:r>
+              <a:rPr lang="en-GB" sz="3200" dirty="0" err="1"/>
+              <a:t>IReadOnlyCollection</a:t>
+            </a:r>
+            <a:endParaRPr lang="en-GB" sz="3200" dirty="0"/>
+          </a:p>
+          <a:p>
+            <a:pPr lvl="2"/>
+            <a:endParaRPr lang="en-GB" sz="3200" dirty="0"/>
+          </a:p>
+        </p:txBody>
+      </p:sp>
+      <p:pic>
+        <p:nvPicPr>
+          <p:cNvPr id="8" name="Picture 7">
+            <a:extLst>
+              <a:ext uri="{FF2B5EF4-FFF2-40B4-BE49-F238E27FC236}">
+                <a16:creationId xmlns:a16="http://schemas.microsoft.com/office/drawing/2014/main" id="{BF768408-B4B3-4C2E-A49E-5CD0052A0360}"/>
+              </a:ext>
+            </a:extLst>
+          </p:cNvPr>
+          <p:cNvPicPr>
+            <a:picLocks noChangeAspect="1"/>
+          </p:cNvPicPr>
+          <p:nvPr/>
+        </p:nvPicPr>
+        <p:blipFill>
+          <a:blip r:embed="rId2"/>
+          <a:stretch>
+            <a:fillRect/>
+          </a:stretch>
+        </p:blipFill>
+        <p:spPr>
+          <a:xfrm>
+            <a:off x="5584791" y="3191938"/>
+            <a:ext cx="5367072" cy="474123"/>
+          </a:xfrm>
+          <a:prstGeom prst="rect">
+            <a:avLst/>
+          </a:prstGeom>
+        </p:spPr>
+      </p:pic>
+      <p:pic>
+        <p:nvPicPr>
+          <p:cNvPr id="10" name="Picture 9">
+            <a:extLst>
+              <a:ext uri="{FF2B5EF4-FFF2-40B4-BE49-F238E27FC236}">
+                <a16:creationId xmlns:a16="http://schemas.microsoft.com/office/drawing/2014/main" id="{D3F44413-DAC0-4935-8BC6-D690499F5AEC}"/>
+              </a:ext>
+            </a:extLst>
+          </p:cNvPr>
+          <p:cNvPicPr>
+            <a:picLocks noChangeAspect="1"/>
+          </p:cNvPicPr>
+          <p:nvPr/>
+        </p:nvPicPr>
+        <p:blipFill>
+          <a:blip r:embed="rId3"/>
+          <a:stretch>
+            <a:fillRect/>
+          </a:stretch>
+        </p:blipFill>
+        <p:spPr>
+          <a:xfrm>
+            <a:off x="6177361" y="1547633"/>
+            <a:ext cx="3831426" cy="1056945"/>
+          </a:xfrm>
+          <a:prstGeom prst="rect">
+            <a:avLst/>
+          </a:prstGeom>
+        </p:spPr>
+      </p:pic>
+      <p:pic>
+        <p:nvPicPr>
+          <p:cNvPr id="11" name="Picture 10">
+            <a:extLst>
+              <a:ext uri="{FF2B5EF4-FFF2-40B4-BE49-F238E27FC236}">
+                <a16:creationId xmlns:a16="http://schemas.microsoft.com/office/drawing/2014/main" id="{BBA3ED28-6730-4B02-914C-3B3707C5C2B5}"/>
+              </a:ext>
+            </a:extLst>
+          </p:cNvPr>
+          <p:cNvPicPr>
+            <a:picLocks noChangeAspect="1"/>
+          </p:cNvPicPr>
+          <p:nvPr/>
+        </p:nvPicPr>
+        <p:blipFill>
+          <a:blip r:embed="rId4"/>
+          <a:stretch>
+            <a:fillRect/>
+          </a:stretch>
+        </p:blipFill>
+        <p:spPr>
+          <a:xfrm>
+            <a:off x="4714877" y="4758014"/>
+            <a:ext cx="7230376" cy="474123"/>
+          </a:xfrm>
+          <a:prstGeom prst="rect">
+            <a:avLst/>
+          </a:prstGeom>
+        </p:spPr>
+      </p:pic>
+    </p:spTree>
+    <p:extLst>
+      <p:ext uri="{BB962C8B-B14F-4D97-AF65-F5344CB8AC3E}">
+        <p14:creationId xmlns:p14="http://schemas.microsoft.com/office/powerpoint/2010/main" val="2817817563"/>
+      </p:ext>
+    </p:extLst>
+  </p:cSld>
+  <p:clrMapOvr>
+    <a:masterClrMapping/>
+  </p:clrMapOvr>
+</p:sld>
+</file>
+
+<file path=ppt/slides/slide13.xml><?xml version="1.0" encoding="utf-8"?>
+<p:sld xmlns:a="http://schemas.openxmlformats.org/drawingml/2006/main" xmlns:r="http://schemas.openxmlformats.org/officeDocument/2006/relationships" xmlns:p="http://schemas.openxmlformats.org/presentationml/2006/main">
+  <p:cSld>
+    <p:spTree>
+      <p:nvGrpSpPr>
+        <p:cNvPr id="1" name=""/>
+        <p:cNvGrpSpPr/>
+        <p:nvPr/>
+      </p:nvGrpSpPr>
+      <p:grpSpPr>
+        <a:xfrm>
+          <a:off x="0" y="0"/>
+          <a:ext cx="0" cy="0"/>
+          <a:chOff x="0" y="0"/>
+          <a:chExt cx="0" cy="0"/>
+        </a:xfrm>
+      </p:grpSpPr>
+      <p:sp>
+        <p:nvSpPr>
+          <p:cNvPr id="4" name="Rectangle 3">
+            <a:extLst>
+              <a:ext uri="{FF2B5EF4-FFF2-40B4-BE49-F238E27FC236}">
+                <a16:creationId xmlns:a16="http://schemas.microsoft.com/office/drawing/2014/main" id="{2058D325-366B-47E5-934D-FC405F65C783}"/>
+              </a:ext>
+            </a:extLst>
+          </p:cNvPr>
+          <p:cNvSpPr/>
+          <p:nvPr/>
+        </p:nvSpPr>
+        <p:spPr>
+          <a:xfrm>
+            <a:off x="3859261" y="234049"/>
+            <a:ext cx="4636206" cy="1323439"/>
+          </a:xfrm>
+          <a:prstGeom prst="rect">
+            <a:avLst/>
+          </a:prstGeom>
+          <a:noFill/>
+        </p:spPr>
+        <p:txBody>
+          <a:bodyPr wrap="none" lIns="91440" tIns="45720" rIns="91440" bIns="45720">
+            <a:spAutoFit/>
+          </a:bodyPr>
+          <a:lstStyle/>
+          <a:p>
+            <a:pPr algn="ctr"/>
+            <a:r>
+              <a:rPr lang="en-US" sz="8000" b="1" cap="none" spc="0" dirty="0">
+                <a:ln w="9525">
+                  <a:solidFill>
+                    <a:schemeClr val="bg1"/>
+                  </a:solidFill>
+                  <a:prstDash val="solid"/>
+                </a:ln>
+                <a:solidFill>
+                  <a:schemeClr val="tx1"/>
+                </a:solidFill>
+                <a:effectLst>
+                  <a:outerShdw blurRad="12700" dist="38100" dir="2700000" algn="tl" rotWithShape="0">
+                    <a:schemeClr val="bg1">
+                      <a:lumMod val="50000"/>
+                    </a:schemeClr>
+                  </a:outerShdw>
+                </a:effectLst>
+              </a:rPr>
+              <a:t>Functions!</a:t>
+            </a:r>
+          </a:p>
+        </p:txBody>
+      </p:sp>
+      <p:sp>
+        <p:nvSpPr>
+          <p:cNvPr id="5" name="Content Placeholder 2">
+            <a:extLst>
+              <a:ext uri="{FF2B5EF4-FFF2-40B4-BE49-F238E27FC236}">
+                <a16:creationId xmlns:a16="http://schemas.microsoft.com/office/drawing/2014/main" id="{93B4D857-0A6D-4657-913A-56C62D4776A0}"/>
+              </a:ext>
+            </a:extLst>
+          </p:cNvPr>
+          <p:cNvSpPr>
+            <a:spLocks noGrp="1"/>
+          </p:cNvSpPr>
+          <p:nvPr>
+            <p:ph idx="1"/>
+          </p:nvPr>
+        </p:nvSpPr>
+        <p:spPr>
+          <a:xfrm>
+            <a:off x="-729574" y="1625863"/>
+            <a:ext cx="5126476" cy="3606274"/>
+          </a:xfrm>
+        </p:spPr>
+        <p:txBody>
+          <a:bodyPr>
+            <a:noAutofit/>
+          </a:bodyPr>
+          <a:lstStyle/>
+          <a:p>
+            <a:pPr lvl="2"/>
+            <a:r>
+              <a:rPr lang="en-GB" sz="3200" dirty="0"/>
+              <a:t>Functions will work as long as they don’t accept other functions as parameters (more on this later)</a:t>
+            </a:r>
+          </a:p>
+          <a:p>
+            <a:pPr lvl="2"/>
+            <a:endParaRPr lang="en-GB" sz="3200" dirty="0"/>
+          </a:p>
+        </p:txBody>
+      </p:sp>
+      <p:pic>
+        <p:nvPicPr>
+          <p:cNvPr id="2" name="Picture 1">
+            <a:extLst>
+              <a:ext uri="{FF2B5EF4-FFF2-40B4-BE49-F238E27FC236}">
+                <a16:creationId xmlns:a16="http://schemas.microsoft.com/office/drawing/2014/main" id="{BB608154-EBC8-480A-A8A2-FF07477F2384}"/>
+              </a:ext>
+            </a:extLst>
+          </p:cNvPr>
+          <p:cNvPicPr>
+            <a:picLocks noChangeAspect="1"/>
+          </p:cNvPicPr>
+          <p:nvPr/>
+        </p:nvPicPr>
+        <p:blipFill>
+          <a:blip r:embed="rId2"/>
+          <a:stretch>
+            <a:fillRect/>
+          </a:stretch>
+        </p:blipFill>
+        <p:spPr>
+          <a:xfrm>
+            <a:off x="5629376" y="1557488"/>
+            <a:ext cx="4069101" cy="1188914"/>
+          </a:xfrm>
+          <a:prstGeom prst="rect">
+            <a:avLst/>
+          </a:prstGeom>
+        </p:spPr>
+      </p:pic>
+      <p:pic>
+        <p:nvPicPr>
+          <p:cNvPr id="3" name="Picture 2">
+            <a:extLst>
+              <a:ext uri="{FF2B5EF4-FFF2-40B4-BE49-F238E27FC236}">
+                <a16:creationId xmlns:a16="http://schemas.microsoft.com/office/drawing/2014/main" id="{BE02A6C4-D9E0-4D7C-B357-E48F5C3BE3BE}"/>
+              </a:ext>
+            </a:extLst>
+          </p:cNvPr>
+          <p:cNvPicPr>
+            <a:picLocks noChangeAspect="1"/>
+          </p:cNvPicPr>
+          <p:nvPr/>
+        </p:nvPicPr>
+        <p:blipFill>
+          <a:blip r:embed="rId3"/>
+          <a:stretch>
+            <a:fillRect/>
+          </a:stretch>
+        </p:blipFill>
+        <p:spPr>
+          <a:xfrm>
+            <a:off x="4380667" y="3271026"/>
+            <a:ext cx="7225982" cy="493578"/>
+          </a:xfrm>
+          <a:prstGeom prst="rect">
+            <a:avLst/>
+          </a:prstGeom>
+        </p:spPr>
+      </p:pic>
+      <p:pic>
+        <p:nvPicPr>
+          <p:cNvPr id="6" name="Picture 5">
+            <a:extLst>
+              <a:ext uri="{FF2B5EF4-FFF2-40B4-BE49-F238E27FC236}">
+                <a16:creationId xmlns:a16="http://schemas.microsoft.com/office/drawing/2014/main" id="{E89A19FE-9673-45CD-A669-5C7E07BAD3F3}"/>
+              </a:ext>
+            </a:extLst>
+          </p:cNvPr>
+          <p:cNvPicPr>
+            <a:picLocks noChangeAspect="1"/>
+          </p:cNvPicPr>
+          <p:nvPr/>
+        </p:nvPicPr>
+        <p:blipFill>
+          <a:blip r:embed="rId4"/>
+          <a:stretch>
+            <a:fillRect/>
+          </a:stretch>
+        </p:blipFill>
+        <p:spPr>
+          <a:xfrm>
+            <a:off x="4805463" y="4337196"/>
+            <a:ext cx="6212913" cy="416974"/>
+          </a:xfrm>
+          <a:prstGeom prst="rect">
+            <a:avLst/>
+          </a:prstGeom>
+        </p:spPr>
+      </p:pic>
+    </p:spTree>
+    <p:extLst>
+      <p:ext uri="{BB962C8B-B14F-4D97-AF65-F5344CB8AC3E}">
+        <p14:creationId xmlns:p14="http://schemas.microsoft.com/office/powerpoint/2010/main" val="3152780966"/>
+      </p:ext>
+    </p:extLst>
+  </p:cSld>
+  <p:clrMapOvr>
+    <a:masterClrMapping/>
+  </p:clrMapOvr>
+</p:sld>
+</file>
+
 <file path=ppt/slides/slide2.xml><?xml version="1.0" encoding="utf-8"?>
 <p:sld xmlns:a="http://schemas.openxmlformats.org/drawingml/2006/main" xmlns:r="http://schemas.openxmlformats.org/officeDocument/2006/relationships" xmlns:p="http://schemas.openxmlformats.org/presentationml/2006/main">
   <p:cSld>

</xml_diff>

<commit_message>
updating examples and slides.
</commit_message>
<xml_diff>
--- a/DotnetInteropSlides.pptx
+++ b/DotnetInteropSlides.pptx
@@ -18,6 +18,10 @@
     <p:sldId id="266" r:id="rId12"/>
     <p:sldId id="267" r:id="rId13"/>
     <p:sldId id="268" r:id="rId14"/>
+    <p:sldId id="269" r:id="rId15"/>
+    <p:sldId id="270" r:id="rId16"/>
+    <p:sldId id="271" r:id="rId17"/>
+    <p:sldId id="272" r:id="rId18"/>
   </p:sldIdLst>
   <p:sldSz cx="12192000" cy="6858000"/>
   <p:notesSz cx="6858000" cy="9144000"/>
@@ -273,7 +277,7 @@
           <a:p>
             <a:fld id="{79BF1C55-0641-464C-A9F1-827E4E83AD03}" type="datetimeFigureOut">
               <a:rPr lang="en-GB" smtClean="0"/>
-              <a:t>08/04/2020</a:t>
+              <a:t>25/05/2020</a:t>
             </a:fld>
             <a:endParaRPr lang="en-GB"/>
           </a:p>
@@ -473,7 +477,7 @@
           <a:p>
             <a:fld id="{79BF1C55-0641-464C-A9F1-827E4E83AD03}" type="datetimeFigureOut">
               <a:rPr lang="en-GB" smtClean="0"/>
-              <a:t>08/04/2020</a:t>
+              <a:t>25/05/2020</a:t>
             </a:fld>
             <a:endParaRPr lang="en-GB"/>
           </a:p>
@@ -683,7 +687,7 @@
           <a:p>
             <a:fld id="{79BF1C55-0641-464C-A9F1-827E4E83AD03}" type="datetimeFigureOut">
               <a:rPr lang="en-GB" smtClean="0"/>
-              <a:t>08/04/2020</a:t>
+              <a:t>25/05/2020</a:t>
             </a:fld>
             <a:endParaRPr lang="en-GB"/>
           </a:p>
@@ -883,7 +887,7 @@
           <a:p>
             <a:fld id="{79BF1C55-0641-464C-A9F1-827E4E83AD03}" type="datetimeFigureOut">
               <a:rPr lang="en-GB" smtClean="0"/>
-              <a:t>08/04/2020</a:t>
+              <a:t>25/05/2020</a:t>
             </a:fld>
             <a:endParaRPr lang="en-GB"/>
           </a:p>
@@ -1159,7 +1163,7 @@
           <a:p>
             <a:fld id="{79BF1C55-0641-464C-A9F1-827E4E83AD03}" type="datetimeFigureOut">
               <a:rPr lang="en-GB" smtClean="0"/>
-              <a:t>08/04/2020</a:t>
+              <a:t>25/05/2020</a:t>
             </a:fld>
             <a:endParaRPr lang="en-GB"/>
           </a:p>
@@ -1427,7 +1431,7 @@
           <a:p>
             <a:fld id="{79BF1C55-0641-464C-A9F1-827E4E83AD03}" type="datetimeFigureOut">
               <a:rPr lang="en-GB" smtClean="0"/>
-              <a:t>08/04/2020</a:t>
+              <a:t>25/05/2020</a:t>
             </a:fld>
             <a:endParaRPr lang="en-GB"/>
           </a:p>
@@ -1842,7 +1846,7 @@
           <a:p>
             <a:fld id="{79BF1C55-0641-464C-A9F1-827E4E83AD03}" type="datetimeFigureOut">
               <a:rPr lang="en-GB" smtClean="0"/>
-              <a:t>08/04/2020</a:t>
+              <a:t>25/05/2020</a:t>
             </a:fld>
             <a:endParaRPr lang="en-GB"/>
           </a:p>
@@ -1984,7 +1988,7 @@
           <a:p>
             <a:fld id="{79BF1C55-0641-464C-A9F1-827E4E83AD03}" type="datetimeFigureOut">
               <a:rPr lang="en-GB" smtClean="0"/>
-              <a:t>08/04/2020</a:t>
+              <a:t>25/05/2020</a:t>
             </a:fld>
             <a:endParaRPr lang="en-GB"/>
           </a:p>
@@ -2097,7 +2101,7 @@
           <a:p>
             <a:fld id="{79BF1C55-0641-464C-A9F1-827E4E83AD03}" type="datetimeFigureOut">
               <a:rPr lang="en-GB" smtClean="0"/>
-              <a:t>08/04/2020</a:t>
+              <a:t>25/05/2020</a:t>
             </a:fld>
             <a:endParaRPr lang="en-GB"/>
           </a:p>
@@ -2410,7 +2414,7 @@
           <a:p>
             <a:fld id="{79BF1C55-0641-464C-A9F1-827E4E83AD03}" type="datetimeFigureOut">
               <a:rPr lang="en-GB" smtClean="0"/>
-              <a:t>08/04/2020</a:t>
+              <a:t>25/05/2020</a:t>
             </a:fld>
             <a:endParaRPr lang="en-GB"/>
           </a:p>
@@ -2699,7 +2703,7 @@
           <a:p>
             <a:fld id="{79BF1C55-0641-464C-A9F1-827E4E83AD03}" type="datetimeFigureOut">
               <a:rPr lang="en-GB" smtClean="0"/>
-              <a:t>08/04/2020</a:t>
+              <a:t>25/05/2020</a:t>
             </a:fld>
             <a:endParaRPr lang="en-GB"/>
           </a:p>
@@ -2942,7 +2946,7 @@
           <a:p>
             <a:fld id="{79BF1C55-0641-464C-A9F1-827E4E83AD03}" type="datetimeFigureOut">
               <a:rPr lang="en-GB" smtClean="0"/>
-              <a:t>08/04/2020</a:t>
+              <a:t>25/05/2020</a:t>
             </a:fld>
             <a:endParaRPr lang="en-GB"/>
           </a:p>
@@ -4665,6 +4669,727 @@
 </p:sld>
 </file>
 
+<file path=ppt/slides/slide14.xml><?xml version="1.0" encoding="utf-8"?>
+<p:sld xmlns:a="http://schemas.openxmlformats.org/drawingml/2006/main" xmlns:r="http://schemas.openxmlformats.org/officeDocument/2006/relationships" xmlns:p="http://schemas.openxmlformats.org/presentationml/2006/main">
+  <p:cSld>
+    <p:spTree>
+      <p:nvGrpSpPr>
+        <p:cNvPr id="1" name=""/>
+        <p:cNvGrpSpPr/>
+        <p:nvPr/>
+      </p:nvGrpSpPr>
+      <p:grpSpPr>
+        <a:xfrm>
+          <a:off x="0" y="0"/>
+          <a:ext cx="0" cy="0"/>
+          <a:chOff x="0" y="0"/>
+          <a:chExt cx="0" cy="0"/>
+        </a:xfrm>
+      </p:grpSpPr>
+      <p:sp>
+        <p:nvSpPr>
+          <p:cNvPr id="4" name="Rectangle 3">
+            <a:extLst>
+              <a:ext uri="{FF2B5EF4-FFF2-40B4-BE49-F238E27FC236}">
+                <a16:creationId xmlns:a16="http://schemas.microsoft.com/office/drawing/2014/main" id="{2058D325-366B-47E5-934D-FC405F65C783}"/>
+              </a:ext>
+            </a:extLst>
+          </p:cNvPr>
+          <p:cNvSpPr/>
+          <p:nvPr/>
+        </p:nvSpPr>
+        <p:spPr>
+          <a:xfrm>
+            <a:off x="1567548" y="234049"/>
+            <a:ext cx="9219640" cy="1323439"/>
+          </a:xfrm>
+          <a:prstGeom prst="rect">
+            <a:avLst/>
+          </a:prstGeom>
+          <a:noFill/>
+        </p:spPr>
+        <p:txBody>
+          <a:bodyPr wrap="none" lIns="91440" tIns="45720" rIns="91440" bIns="45720">
+            <a:spAutoFit/>
+          </a:bodyPr>
+          <a:lstStyle/>
+          <a:p>
+            <a:pPr algn="ctr"/>
+            <a:r>
+              <a:rPr lang="en-US" sz="8000" b="1" cap="none" spc="0" dirty="0">
+                <a:ln w="9525">
+                  <a:solidFill>
+                    <a:schemeClr val="bg1"/>
+                  </a:solidFill>
+                  <a:prstDash val="solid"/>
+                </a:ln>
+                <a:solidFill>
+                  <a:schemeClr val="tx1"/>
+                </a:solidFill>
+                <a:effectLst>
+                  <a:outerShdw blurRad="12700" dist="38100" dir="2700000" algn="tl" rotWithShape="0">
+                    <a:schemeClr val="bg1">
+                      <a:lumMod val="50000"/>
+                    </a:schemeClr>
+                  </a:outerShdw>
+                </a:effectLst>
+              </a:rPr>
+              <a:t>Discriminated Unions</a:t>
+            </a:r>
+          </a:p>
+        </p:txBody>
+      </p:sp>
+      <p:sp>
+        <p:nvSpPr>
+          <p:cNvPr id="5" name="Content Placeholder 2">
+            <a:extLst>
+              <a:ext uri="{FF2B5EF4-FFF2-40B4-BE49-F238E27FC236}">
+                <a16:creationId xmlns:a16="http://schemas.microsoft.com/office/drawing/2014/main" id="{93B4D857-0A6D-4657-913A-56C62D4776A0}"/>
+              </a:ext>
+            </a:extLst>
+          </p:cNvPr>
+          <p:cNvSpPr>
+            <a:spLocks noGrp="1"/>
+          </p:cNvSpPr>
+          <p:nvPr>
+            <p:ph idx="1"/>
+          </p:nvPr>
+        </p:nvSpPr>
+        <p:spPr>
+          <a:xfrm>
+            <a:off x="-729574" y="1625863"/>
+            <a:ext cx="5126476" cy="3606274"/>
+          </a:xfrm>
+        </p:spPr>
+        <p:txBody>
+          <a:bodyPr>
+            <a:noAutofit/>
+          </a:bodyPr>
+          <a:lstStyle/>
+          <a:p>
+            <a:pPr lvl="2"/>
+            <a:r>
+              <a:rPr lang="en-GB" sz="3200" dirty="0"/>
+              <a:t>If Discriminated Unions only have numbers, compiles to </a:t>
+            </a:r>
+            <a:r>
+              <a:rPr lang="en-GB" sz="3200" dirty="0" err="1"/>
+              <a:t>enum</a:t>
+            </a:r>
+            <a:r>
+              <a:rPr lang="en-GB" sz="3200" dirty="0"/>
+              <a:t>. </a:t>
+            </a:r>
+          </a:p>
+          <a:p>
+            <a:pPr lvl="2"/>
+            <a:endParaRPr lang="en-GB" sz="3200" dirty="0"/>
+          </a:p>
+          <a:p>
+            <a:pPr lvl="2"/>
+            <a:r>
+              <a:rPr lang="en-GB" sz="3200" dirty="0"/>
+              <a:t>If Discriminated Union uses types, creates a abstract class which has methods for creating sub-types </a:t>
+            </a:r>
+          </a:p>
+          <a:p>
+            <a:pPr lvl="2"/>
+            <a:endParaRPr lang="en-GB" sz="3200" dirty="0"/>
+          </a:p>
+        </p:txBody>
+      </p:sp>
+      <p:pic>
+        <p:nvPicPr>
+          <p:cNvPr id="7" name="Picture 6">
+            <a:extLst>
+              <a:ext uri="{FF2B5EF4-FFF2-40B4-BE49-F238E27FC236}">
+                <a16:creationId xmlns:a16="http://schemas.microsoft.com/office/drawing/2014/main" id="{DF988633-CCE3-4402-AFE3-BDFB18C34163}"/>
+              </a:ext>
+            </a:extLst>
+          </p:cNvPr>
+          <p:cNvPicPr>
+            <a:picLocks noChangeAspect="1"/>
+          </p:cNvPicPr>
+          <p:nvPr/>
+        </p:nvPicPr>
+        <p:blipFill>
+          <a:blip r:embed="rId2"/>
+          <a:stretch>
+            <a:fillRect/>
+          </a:stretch>
+        </p:blipFill>
+        <p:spPr>
+          <a:xfrm>
+            <a:off x="5177603" y="1625863"/>
+            <a:ext cx="2617497" cy="1325746"/>
+          </a:xfrm>
+          <a:prstGeom prst="rect">
+            <a:avLst/>
+          </a:prstGeom>
+        </p:spPr>
+      </p:pic>
+      <p:pic>
+        <p:nvPicPr>
+          <p:cNvPr id="8" name="Picture 7">
+            <a:extLst>
+              <a:ext uri="{FF2B5EF4-FFF2-40B4-BE49-F238E27FC236}">
+                <a16:creationId xmlns:a16="http://schemas.microsoft.com/office/drawing/2014/main" id="{544C0C91-217B-4E18-9EB3-B3A0AF3D7E91}"/>
+              </a:ext>
+            </a:extLst>
+          </p:cNvPr>
+          <p:cNvPicPr>
+            <a:picLocks noChangeAspect="1"/>
+          </p:cNvPicPr>
+          <p:nvPr/>
+        </p:nvPicPr>
+        <p:blipFill>
+          <a:blip r:embed="rId3"/>
+          <a:stretch>
+            <a:fillRect/>
+          </a:stretch>
+        </p:blipFill>
+        <p:spPr>
+          <a:xfrm>
+            <a:off x="8244065" y="1625863"/>
+            <a:ext cx="2423734" cy="1343966"/>
+          </a:xfrm>
+          <a:prstGeom prst="rect">
+            <a:avLst/>
+          </a:prstGeom>
+        </p:spPr>
+      </p:pic>
+      <p:pic>
+        <p:nvPicPr>
+          <p:cNvPr id="9" name="Picture 8">
+            <a:extLst>
+              <a:ext uri="{FF2B5EF4-FFF2-40B4-BE49-F238E27FC236}">
+                <a16:creationId xmlns:a16="http://schemas.microsoft.com/office/drawing/2014/main" id="{3FBBBBB1-55C7-4EAE-9136-105AFEA95044}"/>
+              </a:ext>
+            </a:extLst>
+          </p:cNvPr>
+          <p:cNvPicPr>
+            <a:picLocks noChangeAspect="1"/>
+          </p:cNvPicPr>
+          <p:nvPr/>
+        </p:nvPicPr>
+        <p:blipFill>
+          <a:blip r:embed="rId4"/>
+          <a:stretch>
+            <a:fillRect/>
+          </a:stretch>
+        </p:blipFill>
+        <p:spPr>
+          <a:xfrm>
+            <a:off x="4982096" y="3261157"/>
+            <a:ext cx="5982534" cy="3362794"/>
+          </a:xfrm>
+          <a:prstGeom prst="rect">
+            <a:avLst/>
+          </a:prstGeom>
+        </p:spPr>
+      </p:pic>
+      <p:pic>
+        <p:nvPicPr>
+          <p:cNvPr id="10" name="Picture 9">
+            <a:extLst>
+              <a:ext uri="{FF2B5EF4-FFF2-40B4-BE49-F238E27FC236}">
+                <a16:creationId xmlns:a16="http://schemas.microsoft.com/office/drawing/2014/main" id="{84F25A64-E8CC-4B0A-B2FE-E33441ADBF0E}"/>
+              </a:ext>
+            </a:extLst>
+          </p:cNvPr>
+          <p:cNvPicPr>
+            <a:picLocks noChangeAspect="1"/>
+          </p:cNvPicPr>
+          <p:nvPr/>
+        </p:nvPicPr>
+        <p:blipFill>
+          <a:blip r:embed="rId5"/>
+          <a:stretch>
+            <a:fillRect/>
+          </a:stretch>
+        </p:blipFill>
+        <p:spPr>
+          <a:xfrm>
+            <a:off x="7973363" y="3495712"/>
+            <a:ext cx="2905530" cy="714475"/>
+          </a:xfrm>
+          <a:prstGeom prst="rect">
+            <a:avLst/>
+          </a:prstGeom>
+          <a:ln>
+            <a:solidFill>
+              <a:schemeClr val="bg1"/>
+            </a:solidFill>
+          </a:ln>
+        </p:spPr>
+      </p:pic>
+    </p:spTree>
+    <p:extLst>
+      <p:ext uri="{BB962C8B-B14F-4D97-AF65-F5344CB8AC3E}">
+        <p14:creationId xmlns:p14="http://schemas.microsoft.com/office/powerpoint/2010/main" val="418123097"/>
+      </p:ext>
+    </p:extLst>
+  </p:cSld>
+  <p:clrMapOvr>
+    <a:masterClrMapping/>
+  </p:clrMapOvr>
+</p:sld>
+</file>
+
+<file path=ppt/slides/slide15.xml><?xml version="1.0" encoding="utf-8"?>
+<p:sld xmlns:a="http://schemas.openxmlformats.org/drawingml/2006/main" xmlns:r="http://schemas.openxmlformats.org/officeDocument/2006/relationships" xmlns:p="http://schemas.openxmlformats.org/presentationml/2006/main">
+  <p:cSld>
+    <p:spTree>
+      <p:nvGrpSpPr>
+        <p:cNvPr id="1" name=""/>
+        <p:cNvGrpSpPr/>
+        <p:nvPr/>
+      </p:nvGrpSpPr>
+      <p:grpSpPr>
+        <a:xfrm>
+          <a:off x="0" y="0"/>
+          <a:ext cx="0" cy="0"/>
+          <a:chOff x="0" y="0"/>
+          <a:chExt cx="0" cy="0"/>
+        </a:xfrm>
+      </p:grpSpPr>
+      <p:sp>
+        <p:nvSpPr>
+          <p:cNvPr id="4" name="Rectangle 3">
+            <a:extLst>
+              <a:ext uri="{FF2B5EF4-FFF2-40B4-BE49-F238E27FC236}">
+                <a16:creationId xmlns:a16="http://schemas.microsoft.com/office/drawing/2014/main" id="{2058D325-366B-47E5-934D-FC405F65C783}"/>
+              </a:ext>
+            </a:extLst>
+          </p:cNvPr>
+          <p:cNvSpPr/>
+          <p:nvPr/>
+        </p:nvSpPr>
+        <p:spPr>
+          <a:xfrm>
+            <a:off x="5171324" y="234049"/>
+            <a:ext cx="2012089" cy="1323439"/>
+          </a:xfrm>
+          <a:prstGeom prst="rect">
+            <a:avLst/>
+          </a:prstGeom>
+          <a:noFill/>
+        </p:spPr>
+        <p:txBody>
+          <a:bodyPr wrap="none" lIns="91440" tIns="45720" rIns="91440" bIns="45720">
+            <a:spAutoFit/>
+          </a:bodyPr>
+          <a:lstStyle/>
+          <a:p>
+            <a:pPr algn="ctr"/>
+            <a:r>
+              <a:rPr lang="en-US" sz="8000" b="1" cap="none" spc="0" dirty="0">
+                <a:ln w="9525">
+                  <a:solidFill>
+                    <a:schemeClr val="bg1"/>
+                  </a:solidFill>
+                  <a:prstDash val="solid"/>
+                </a:ln>
+                <a:solidFill>
+                  <a:schemeClr val="tx1"/>
+                </a:solidFill>
+                <a:effectLst>
+                  <a:outerShdw blurRad="12700" dist="38100" dir="2700000" algn="tl" rotWithShape="0">
+                    <a:schemeClr val="bg1">
+                      <a:lumMod val="50000"/>
+                    </a:schemeClr>
+                  </a:outerShdw>
+                </a:effectLst>
+              </a:rPr>
+              <a:t>Unit</a:t>
+            </a:r>
+          </a:p>
+        </p:txBody>
+      </p:sp>
+      <p:sp>
+        <p:nvSpPr>
+          <p:cNvPr id="5" name="Content Placeholder 2">
+            <a:extLst>
+              <a:ext uri="{FF2B5EF4-FFF2-40B4-BE49-F238E27FC236}">
+                <a16:creationId xmlns:a16="http://schemas.microsoft.com/office/drawing/2014/main" id="{93B4D857-0A6D-4657-913A-56C62D4776A0}"/>
+              </a:ext>
+            </a:extLst>
+          </p:cNvPr>
+          <p:cNvSpPr>
+            <a:spLocks noGrp="1"/>
+          </p:cNvSpPr>
+          <p:nvPr>
+            <p:ph idx="1"/>
+          </p:nvPr>
+        </p:nvSpPr>
+        <p:spPr>
+          <a:xfrm>
+            <a:off x="-729574" y="1625863"/>
+            <a:ext cx="5126476" cy="3606274"/>
+          </a:xfrm>
+        </p:spPr>
+        <p:txBody>
+          <a:bodyPr>
+            <a:noAutofit/>
+          </a:bodyPr>
+          <a:lstStyle/>
+          <a:p>
+            <a:pPr lvl="2"/>
+            <a:r>
+              <a:rPr lang="en-GB" sz="3200" dirty="0"/>
+              <a:t>If a function returns Unit, compiles down to return void</a:t>
+            </a:r>
+          </a:p>
+          <a:p>
+            <a:pPr lvl="2"/>
+            <a:endParaRPr lang="en-GB" sz="3200" dirty="0"/>
+          </a:p>
+          <a:p>
+            <a:pPr lvl="2"/>
+            <a:r>
+              <a:rPr lang="en-GB" sz="3200" dirty="0"/>
+              <a:t>If used as a parameter, use null</a:t>
+            </a:r>
+          </a:p>
+          <a:p>
+            <a:pPr lvl="2"/>
+            <a:endParaRPr lang="en-GB" sz="3200" dirty="0"/>
+          </a:p>
+        </p:txBody>
+      </p:sp>
+      <p:pic>
+        <p:nvPicPr>
+          <p:cNvPr id="2" name="Picture 1">
+            <a:extLst>
+              <a:ext uri="{FF2B5EF4-FFF2-40B4-BE49-F238E27FC236}">
+                <a16:creationId xmlns:a16="http://schemas.microsoft.com/office/drawing/2014/main" id="{1F0F7F87-0EA8-49CF-A744-8AB380708287}"/>
+              </a:ext>
+            </a:extLst>
+          </p:cNvPr>
+          <p:cNvPicPr>
+            <a:picLocks noChangeAspect="1"/>
+          </p:cNvPicPr>
+          <p:nvPr/>
+        </p:nvPicPr>
+        <p:blipFill>
+          <a:blip r:embed="rId2"/>
+          <a:stretch>
+            <a:fillRect/>
+          </a:stretch>
+        </p:blipFill>
+        <p:spPr>
+          <a:xfrm>
+            <a:off x="5431238" y="1871637"/>
+            <a:ext cx="4470997" cy="838312"/>
+          </a:xfrm>
+          <a:prstGeom prst="rect">
+            <a:avLst/>
+          </a:prstGeom>
+        </p:spPr>
+      </p:pic>
+      <p:pic>
+        <p:nvPicPr>
+          <p:cNvPr id="3" name="Picture 2">
+            <a:extLst>
+              <a:ext uri="{FF2B5EF4-FFF2-40B4-BE49-F238E27FC236}">
+                <a16:creationId xmlns:a16="http://schemas.microsoft.com/office/drawing/2014/main" id="{3B74CDE9-0595-40A4-B707-ED00D545CDDA}"/>
+              </a:ext>
+            </a:extLst>
+          </p:cNvPr>
+          <p:cNvPicPr>
+            <a:picLocks noChangeAspect="1"/>
+          </p:cNvPicPr>
+          <p:nvPr/>
+        </p:nvPicPr>
+        <p:blipFill>
+          <a:blip r:embed="rId3"/>
+          <a:stretch>
+            <a:fillRect/>
+          </a:stretch>
+        </p:blipFill>
+        <p:spPr>
+          <a:xfrm>
+            <a:off x="5056353" y="3350270"/>
+            <a:ext cx="5737270" cy="490210"/>
+          </a:xfrm>
+          <a:prstGeom prst="rect">
+            <a:avLst/>
+          </a:prstGeom>
+        </p:spPr>
+      </p:pic>
+    </p:spTree>
+    <p:extLst>
+      <p:ext uri="{BB962C8B-B14F-4D97-AF65-F5344CB8AC3E}">
+        <p14:creationId xmlns:p14="http://schemas.microsoft.com/office/powerpoint/2010/main" val="64817964"/>
+      </p:ext>
+    </p:extLst>
+  </p:cSld>
+  <p:clrMapOvr>
+    <a:masterClrMapping/>
+  </p:clrMapOvr>
+</p:sld>
+</file>
+
+<file path=ppt/slides/slide16.xml><?xml version="1.0" encoding="utf-8"?>
+<p:sld xmlns:a="http://schemas.openxmlformats.org/drawingml/2006/main" xmlns:r="http://schemas.openxmlformats.org/officeDocument/2006/relationships" xmlns:p="http://schemas.openxmlformats.org/presentationml/2006/main">
+  <p:cSld>
+    <p:spTree>
+      <p:nvGrpSpPr>
+        <p:cNvPr id="1" name=""/>
+        <p:cNvGrpSpPr/>
+        <p:nvPr/>
+      </p:nvGrpSpPr>
+      <p:grpSpPr>
+        <a:xfrm>
+          <a:off x="0" y="0"/>
+          <a:ext cx="0" cy="0"/>
+          <a:chOff x="0" y="0"/>
+          <a:chExt cx="0" cy="0"/>
+        </a:xfrm>
+      </p:grpSpPr>
+      <p:sp>
+        <p:nvSpPr>
+          <p:cNvPr id="4" name="Rectangle 3">
+            <a:extLst>
+              <a:ext uri="{FF2B5EF4-FFF2-40B4-BE49-F238E27FC236}">
+                <a16:creationId xmlns:a16="http://schemas.microsoft.com/office/drawing/2014/main" id="{2058D325-366B-47E5-934D-FC405F65C783}"/>
+              </a:ext>
+            </a:extLst>
+          </p:cNvPr>
+          <p:cNvSpPr/>
+          <p:nvPr/>
+        </p:nvSpPr>
+        <p:spPr>
+          <a:xfrm>
+            <a:off x="2267839" y="2151727"/>
+            <a:ext cx="7208669" cy="2554545"/>
+          </a:xfrm>
+          <a:prstGeom prst="rect">
+            <a:avLst/>
+          </a:prstGeom>
+          <a:noFill/>
+        </p:spPr>
+        <p:txBody>
+          <a:bodyPr wrap="square" lIns="91440" tIns="45720" rIns="91440" bIns="45720">
+            <a:spAutoFit/>
+          </a:bodyPr>
+          <a:lstStyle/>
+          <a:p>
+            <a:pPr algn="ctr"/>
+            <a:r>
+              <a:rPr lang="en-US" sz="8000" b="1" cap="none" spc="0" dirty="0">
+                <a:ln w="9525">
+                  <a:solidFill>
+                    <a:schemeClr val="bg1"/>
+                  </a:solidFill>
+                  <a:prstDash val="solid"/>
+                </a:ln>
+                <a:solidFill>
+                  <a:schemeClr val="tx1"/>
+                </a:solidFill>
+                <a:effectLst>
+                  <a:outerShdw blurRad="12700" dist="38100" dir="2700000" algn="tl" rotWithShape="0">
+                    <a:schemeClr val="bg1">
+                      <a:lumMod val="50000"/>
+                    </a:schemeClr>
+                  </a:outerShdw>
+                </a:effectLst>
+              </a:rPr>
+              <a:t>Things that work not so well</a:t>
+            </a:r>
+          </a:p>
+        </p:txBody>
+      </p:sp>
+    </p:spTree>
+    <p:extLst>
+      <p:ext uri="{BB962C8B-B14F-4D97-AF65-F5344CB8AC3E}">
+        <p14:creationId xmlns:p14="http://schemas.microsoft.com/office/powerpoint/2010/main" val="675652422"/>
+      </p:ext>
+    </p:extLst>
+  </p:cSld>
+  <p:clrMapOvr>
+    <a:masterClrMapping/>
+  </p:clrMapOvr>
+</p:sld>
+</file>
+
+<file path=ppt/slides/slide17.xml><?xml version="1.0" encoding="utf-8"?>
+<p:sld xmlns:a="http://schemas.openxmlformats.org/drawingml/2006/main" xmlns:r="http://schemas.openxmlformats.org/officeDocument/2006/relationships" xmlns:p="http://schemas.openxmlformats.org/presentationml/2006/main">
+  <p:cSld>
+    <p:spTree>
+      <p:nvGrpSpPr>
+        <p:cNvPr id="1" name=""/>
+        <p:cNvGrpSpPr/>
+        <p:nvPr/>
+      </p:nvGrpSpPr>
+      <p:grpSpPr>
+        <a:xfrm>
+          <a:off x="0" y="0"/>
+          <a:ext cx="0" cy="0"/>
+          <a:chOff x="0" y="0"/>
+          <a:chExt cx="0" cy="0"/>
+        </a:xfrm>
+      </p:grpSpPr>
+      <p:sp>
+        <p:nvSpPr>
+          <p:cNvPr id="4" name="Rectangle 3">
+            <a:extLst>
+              <a:ext uri="{FF2B5EF4-FFF2-40B4-BE49-F238E27FC236}">
+                <a16:creationId xmlns:a16="http://schemas.microsoft.com/office/drawing/2014/main" id="{2058D325-366B-47E5-934D-FC405F65C783}"/>
+              </a:ext>
+            </a:extLst>
+          </p:cNvPr>
+          <p:cNvSpPr/>
+          <p:nvPr/>
+        </p:nvSpPr>
+        <p:spPr>
+          <a:xfrm>
+            <a:off x="5161065" y="234049"/>
+            <a:ext cx="2032608" cy="1323439"/>
+          </a:xfrm>
+          <a:prstGeom prst="rect">
+            <a:avLst/>
+          </a:prstGeom>
+          <a:noFill/>
+        </p:spPr>
+        <p:txBody>
+          <a:bodyPr wrap="none" lIns="91440" tIns="45720" rIns="91440" bIns="45720">
+            <a:spAutoFit/>
+          </a:bodyPr>
+          <a:lstStyle/>
+          <a:p>
+            <a:pPr algn="ctr"/>
+            <a:r>
+              <a:rPr lang="en-US" sz="8000" b="1" dirty="0">
+                <a:ln w="9525">
+                  <a:solidFill>
+                    <a:schemeClr val="bg1"/>
+                  </a:solidFill>
+                  <a:prstDash val="solid"/>
+                </a:ln>
+                <a:effectLst>
+                  <a:outerShdw blurRad="12700" dist="38100" dir="2700000" algn="tl" rotWithShape="0">
+                    <a:schemeClr val="bg1">
+                      <a:lumMod val="50000"/>
+                    </a:schemeClr>
+                  </a:outerShdw>
+                </a:effectLst>
+              </a:rPr>
+              <a:t>Lists</a:t>
+            </a:r>
+            <a:endParaRPr lang="en-US" sz="8000" b="1" cap="none" spc="0" dirty="0">
+              <a:ln w="9525">
+                <a:solidFill>
+                  <a:schemeClr val="bg1"/>
+                </a:solidFill>
+                <a:prstDash val="solid"/>
+              </a:ln>
+              <a:solidFill>
+                <a:schemeClr val="tx1"/>
+              </a:solidFill>
+              <a:effectLst>
+                <a:outerShdw blurRad="12700" dist="38100" dir="2700000" algn="tl" rotWithShape="0">
+                  <a:schemeClr val="bg1">
+                    <a:lumMod val="50000"/>
+                  </a:schemeClr>
+                </a:outerShdw>
+              </a:effectLst>
+            </a:endParaRPr>
+          </a:p>
+        </p:txBody>
+      </p:sp>
+      <p:sp>
+        <p:nvSpPr>
+          <p:cNvPr id="5" name="Content Placeholder 2">
+            <a:extLst>
+              <a:ext uri="{FF2B5EF4-FFF2-40B4-BE49-F238E27FC236}">
+                <a16:creationId xmlns:a16="http://schemas.microsoft.com/office/drawing/2014/main" id="{93B4D857-0A6D-4657-913A-56C62D4776A0}"/>
+              </a:ext>
+            </a:extLst>
+          </p:cNvPr>
+          <p:cNvSpPr>
+            <a:spLocks noGrp="1"/>
+          </p:cNvSpPr>
+          <p:nvPr>
+            <p:ph idx="1"/>
+          </p:nvPr>
+        </p:nvSpPr>
+        <p:spPr>
+          <a:xfrm>
+            <a:off x="-729574" y="1625863"/>
+            <a:ext cx="5126476" cy="3606274"/>
+          </a:xfrm>
+        </p:spPr>
+        <p:txBody>
+          <a:bodyPr>
+            <a:noAutofit/>
+          </a:bodyPr>
+          <a:lstStyle/>
+          <a:p>
+            <a:pPr lvl="2"/>
+            <a:r>
+              <a:rPr lang="en-GB" sz="3200" dirty="0"/>
+              <a:t>Lists in F# are different to C# Lists, this may cause some confusion. </a:t>
+            </a:r>
+          </a:p>
+          <a:p>
+            <a:pPr lvl="2"/>
+            <a:r>
+              <a:rPr lang="en-GB" sz="3200" dirty="0"/>
+              <a:t>You can import </a:t>
+            </a:r>
+            <a:r>
+              <a:rPr lang="en-GB" sz="3200" dirty="0" err="1"/>
+              <a:t>FsharpList</a:t>
+            </a:r>
+            <a:r>
+              <a:rPr lang="en-GB" sz="3200" dirty="0"/>
+              <a:t>&lt;&gt; type from </a:t>
+            </a:r>
+            <a:r>
+              <a:rPr lang="en-GB" sz="3200" dirty="0" err="1"/>
+              <a:t>Fsharp.Core</a:t>
+            </a:r>
+            <a:r>
+              <a:rPr lang="en-GB" sz="3200" dirty="0"/>
+              <a:t> N </a:t>
+            </a:r>
+            <a:r>
+              <a:rPr lang="en-GB" sz="3200" dirty="0" err="1"/>
+              <a:t>uget</a:t>
+            </a:r>
+            <a:r>
+              <a:rPr lang="en-GB" sz="3200" dirty="0"/>
+              <a:t> package.</a:t>
+            </a:r>
+          </a:p>
+          <a:p>
+            <a:pPr lvl="2"/>
+            <a:r>
+              <a:rPr lang="en-GB" sz="3200" dirty="0"/>
+              <a:t>Or just use </a:t>
+            </a:r>
+            <a:r>
+              <a:rPr lang="en-GB" sz="3200" dirty="0" err="1"/>
+              <a:t>IRedonlyCollection</a:t>
+            </a:r>
+            <a:endParaRPr lang="en-GB" sz="3200" dirty="0"/>
+          </a:p>
+        </p:txBody>
+      </p:sp>
+    </p:spTree>
+    <p:extLst>
+      <p:ext uri="{BB962C8B-B14F-4D97-AF65-F5344CB8AC3E}">
+        <p14:creationId xmlns:p14="http://schemas.microsoft.com/office/powerpoint/2010/main" val="189725039"/>
+      </p:ext>
+    </p:extLst>
+  </p:cSld>
+  <p:clrMapOvr>
+    <a:masterClrMapping/>
+  </p:clrMapOvr>
+</p:sld>
+</file>
+
 <file path=ppt/slides/slide2.xml><?xml version="1.0" encoding="utf-8"?>
 <p:sld xmlns:a="http://schemas.openxmlformats.org/drawingml/2006/main" xmlns:r="http://schemas.openxmlformats.org/officeDocument/2006/relationships" xmlns:p="http://schemas.openxmlformats.org/presentationml/2006/main">
   <p:cSld>

</xml_diff>

<commit_message>
further slide changes and updates to examples
</commit_message>
<xml_diff>
--- a/DotnetInteropSlides.pptx
+++ b/DotnetInteropSlides.pptx
@@ -22,6 +22,11 @@
     <p:sldId id="270" r:id="rId16"/>
     <p:sldId id="271" r:id="rId17"/>
     <p:sldId id="272" r:id="rId18"/>
+    <p:sldId id="273" r:id="rId19"/>
+    <p:sldId id="274" r:id="rId20"/>
+    <p:sldId id="275" r:id="rId21"/>
+    <p:sldId id="276" r:id="rId22"/>
+    <p:sldId id="277" r:id="rId23"/>
   </p:sldIdLst>
   <p:sldSz cx="12192000" cy="6858000"/>
   <p:notesSz cx="6858000" cy="9144000"/>
@@ -277,7 +282,7 @@
           <a:p>
             <a:fld id="{79BF1C55-0641-464C-A9F1-827E4E83AD03}" type="datetimeFigureOut">
               <a:rPr lang="en-GB" smtClean="0"/>
-              <a:t>25/05/2020</a:t>
+              <a:t>05/07/2020</a:t>
             </a:fld>
             <a:endParaRPr lang="en-GB"/>
           </a:p>
@@ -477,7 +482,7 @@
           <a:p>
             <a:fld id="{79BF1C55-0641-464C-A9F1-827E4E83AD03}" type="datetimeFigureOut">
               <a:rPr lang="en-GB" smtClean="0"/>
-              <a:t>25/05/2020</a:t>
+              <a:t>05/07/2020</a:t>
             </a:fld>
             <a:endParaRPr lang="en-GB"/>
           </a:p>
@@ -687,7 +692,7 @@
           <a:p>
             <a:fld id="{79BF1C55-0641-464C-A9F1-827E4E83AD03}" type="datetimeFigureOut">
               <a:rPr lang="en-GB" smtClean="0"/>
-              <a:t>25/05/2020</a:t>
+              <a:t>05/07/2020</a:t>
             </a:fld>
             <a:endParaRPr lang="en-GB"/>
           </a:p>
@@ -887,7 +892,7 @@
           <a:p>
             <a:fld id="{79BF1C55-0641-464C-A9F1-827E4E83AD03}" type="datetimeFigureOut">
               <a:rPr lang="en-GB" smtClean="0"/>
-              <a:t>25/05/2020</a:t>
+              <a:t>05/07/2020</a:t>
             </a:fld>
             <a:endParaRPr lang="en-GB"/>
           </a:p>
@@ -1163,7 +1168,7 @@
           <a:p>
             <a:fld id="{79BF1C55-0641-464C-A9F1-827E4E83AD03}" type="datetimeFigureOut">
               <a:rPr lang="en-GB" smtClean="0"/>
-              <a:t>25/05/2020</a:t>
+              <a:t>05/07/2020</a:t>
             </a:fld>
             <a:endParaRPr lang="en-GB"/>
           </a:p>
@@ -1431,7 +1436,7 @@
           <a:p>
             <a:fld id="{79BF1C55-0641-464C-A9F1-827E4E83AD03}" type="datetimeFigureOut">
               <a:rPr lang="en-GB" smtClean="0"/>
-              <a:t>25/05/2020</a:t>
+              <a:t>05/07/2020</a:t>
             </a:fld>
             <a:endParaRPr lang="en-GB"/>
           </a:p>
@@ -1846,7 +1851,7 @@
           <a:p>
             <a:fld id="{79BF1C55-0641-464C-A9F1-827E4E83AD03}" type="datetimeFigureOut">
               <a:rPr lang="en-GB" smtClean="0"/>
-              <a:t>25/05/2020</a:t>
+              <a:t>05/07/2020</a:t>
             </a:fld>
             <a:endParaRPr lang="en-GB"/>
           </a:p>
@@ -1988,7 +1993,7 @@
           <a:p>
             <a:fld id="{79BF1C55-0641-464C-A9F1-827E4E83AD03}" type="datetimeFigureOut">
               <a:rPr lang="en-GB" smtClean="0"/>
-              <a:t>25/05/2020</a:t>
+              <a:t>05/07/2020</a:t>
             </a:fld>
             <a:endParaRPr lang="en-GB"/>
           </a:p>
@@ -2101,7 +2106,7 @@
           <a:p>
             <a:fld id="{79BF1C55-0641-464C-A9F1-827E4E83AD03}" type="datetimeFigureOut">
               <a:rPr lang="en-GB" smtClean="0"/>
-              <a:t>25/05/2020</a:t>
+              <a:t>05/07/2020</a:t>
             </a:fld>
             <a:endParaRPr lang="en-GB"/>
           </a:p>
@@ -2414,7 +2419,7 @@
           <a:p>
             <a:fld id="{79BF1C55-0641-464C-A9F1-827E4E83AD03}" type="datetimeFigureOut">
               <a:rPr lang="en-GB" smtClean="0"/>
-              <a:t>25/05/2020</a:t>
+              <a:t>05/07/2020</a:t>
             </a:fld>
             <a:endParaRPr lang="en-GB"/>
           </a:p>
@@ -2703,7 +2708,7 @@
           <a:p>
             <a:fld id="{79BF1C55-0641-464C-A9F1-827E4E83AD03}" type="datetimeFigureOut">
               <a:rPr lang="en-GB" smtClean="0"/>
-              <a:t>25/05/2020</a:t>
+              <a:t>05/07/2020</a:t>
             </a:fld>
             <a:endParaRPr lang="en-GB"/>
           </a:p>
@@ -2946,7 +2951,7 @@
           <a:p>
             <a:fld id="{79BF1C55-0641-464C-A9F1-827E4E83AD03}" type="datetimeFigureOut">
               <a:rPr lang="en-GB" smtClean="0"/>
-              <a:t>25/05/2020</a:t>
+              <a:t>05/07/2020</a:t>
             </a:fld>
             <a:endParaRPr lang="en-GB"/>
           </a:p>
@@ -4285,7 +4290,7 @@
         </p:nvSpPr>
         <p:spPr>
           <a:xfrm>
-            <a:off x="-729574" y="1625863"/>
+            <a:off x="-218365" y="2347316"/>
             <a:ext cx="5126476" cy="3606274"/>
           </a:xfrm>
         </p:spPr>
@@ -4319,36 +4324,6 @@
               <a:rPr lang="en-GB" sz="3200" dirty="0" err="1"/>
               <a:t>IEnumerable</a:t>
             </a:r>
-            <a:endParaRPr lang="en-GB" sz="3200" dirty="0"/>
-          </a:p>
-          <a:p>
-            <a:pPr marL="914400" lvl="2" indent="0">
-              <a:buNone/>
-            </a:pPr>
-            <a:endParaRPr lang="en-GB" sz="3200" dirty="0"/>
-          </a:p>
-          <a:p>
-            <a:pPr lvl="2"/>
-            <a:r>
-              <a:rPr lang="en-GB" sz="3200" dirty="0"/>
-              <a:t>Lists are a separate type  (</a:t>
-            </a:r>
-            <a:r>
-              <a:rPr lang="en-GB" sz="3200" dirty="0" err="1"/>
-              <a:t>FSharpList</a:t>
-            </a:r>
-            <a:r>
-              <a:rPr lang="en-GB" sz="3200" dirty="0"/>
-              <a:t>) but implement the </a:t>
-            </a:r>
-            <a:r>
-              <a:rPr lang="en-GB" sz="3200" dirty="0" err="1"/>
-              <a:t>IReadOnlyCollection</a:t>
-            </a:r>
-            <a:endParaRPr lang="en-GB" sz="3200" dirty="0"/>
-          </a:p>
-          <a:p>
-            <a:pPr lvl="2"/>
             <a:endParaRPr lang="en-GB" sz="3200" dirty="0"/>
           </a:p>
         </p:txBody>
@@ -4375,7 +4350,7 @@
         </p:blipFill>
         <p:spPr>
           <a:xfrm>
-            <a:off x="5584791" y="3191938"/>
+            <a:off x="6096000" y="3913391"/>
             <a:ext cx="5367072" cy="474123"/>
           </a:xfrm>
           <a:prstGeom prst="rect">
@@ -4405,38 +4380,8 @@
         </p:blipFill>
         <p:spPr>
           <a:xfrm>
-            <a:off x="6177361" y="1547633"/>
+            <a:off x="6688570" y="2269086"/>
             <a:ext cx="3831426" cy="1056945"/>
-          </a:xfrm>
-          <a:prstGeom prst="rect">
-            <a:avLst/>
-          </a:prstGeom>
-        </p:spPr>
-      </p:pic>
-      <p:pic>
-        <p:nvPicPr>
-          <p:cNvPr id="11" name="Picture 10">
-            <a:extLst>
-              <a:ext uri="{FF2B5EF4-FFF2-40B4-BE49-F238E27FC236}">
-                <a16:creationId xmlns:a16="http://schemas.microsoft.com/office/drawing/2014/main" id="{BBA3ED28-6730-4B02-914C-3B3707C5C2B5}"/>
-              </a:ext>
-            </a:extLst>
-          </p:cNvPr>
-          <p:cNvPicPr>
-            <a:picLocks noChangeAspect="1"/>
-          </p:cNvPicPr>
-          <p:nvPr/>
-        </p:nvPicPr>
-        <p:blipFill>
-          <a:blip r:embed="rId4"/>
-          <a:stretch>
-            <a:fillRect/>
-          </a:stretch>
-        </p:blipFill>
-        <p:spPr>
-          <a:xfrm>
-            <a:off x="4714877" y="4758014"/>
-            <a:ext cx="7230376" cy="474123"/>
           </a:xfrm>
           <a:prstGeom prst="rect">
             <a:avLst/>
@@ -5344,7 +5289,7 @@
             </a:r>
             <a:r>
               <a:rPr lang="en-GB" sz="3200" dirty="0"/>
-              <a:t>&lt;&gt; type from </a:t>
+              <a:t>&lt;T&gt; type from </a:t>
             </a:r>
             <a:r>
               <a:rPr lang="en-GB" sz="3200" dirty="0" err="1"/>
@@ -5352,11 +5297,11 @@
             </a:r>
             <a:r>
               <a:rPr lang="en-GB" sz="3200" dirty="0"/>
-              <a:t> N </a:t>
+              <a:t> </a:t>
             </a:r>
             <a:r>
               <a:rPr lang="en-GB" sz="3200" dirty="0" err="1"/>
-              <a:t>uget</a:t>
+              <a:t>Nuget</a:t>
             </a:r>
             <a:r>
               <a:rPr lang="en-GB" sz="3200" dirty="0"/>
@@ -5371,16 +5316,531 @@
             </a:r>
             <a:r>
               <a:rPr lang="en-GB" sz="3200" dirty="0" err="1"/>
-              <a:t>IRedonlyCollection</a:t>
+              <a:t>IReadonlyCollection</a:t>
             </a:r>
             <a:endParaRPr lang="en-GB" sz="3200" dirty="0"/>
           </a:p>
         </p:txBody>
       </p:sp>
+      <p:pic>
+        <p:nvPicPr>
+          <p:cNvPr id="2" name="Picture 1">
+            <a:extLst>
+              <a:ext uri="{FF2B5EF4-FFF2-40B4-BE49-F238E27FC236}">
+                <a16:creationId xmlns:a16="http://schemas.microsoft.com/office/drawing/2014/main" id="{22999246-BAE2-4776-BB4C-552B114536DA}"/>
+              </a:ext>
+            </a:extLst>
+          </p:cNvPr>
+          <p:cNvPicPr>
+            <a:picLocks noChangeAspect="1"/>
+          </p:cNvPicPr>
+          <p:nvPr/>
+        </p:nvPicPr>
+        <p:blipFill>
+          <a:blip r:embed="rId2"/>
+          <a:stretch>
+            <a:fillRect/>
+          </a:stretch>
+        </p:blipFill>
+        <p:spPr>
+          <a:xfrm>
+            <a:off x="4302716" y="3993055"/>
+            <a:ext cx="7597397" cy="369220"/>
+          </a:xfrm>
+          <a:prstGeom prst="rect">
+            <a:avLst/>
+          </a:prstGeom>
+        </p:spPr>
+      </p:pic>
+      <p:pic>
+        <p:nvPicPr>
+          <p:cNvPr id="3" name="Picture 2">
+            <a:extLst>
+              <a:ext uri="{FF2B5EF4-FFF2-40B4-BE49-F238E27FC236}">
+                <a16:creationId xmlns:a16="http://schemas.microsoft.com/office/drawing/2014/main" id="{1E8E4675-350A-4295-B2C4-1F33608937BD}"/>
+              </a:ext>
+            </a:extLst>
+          </p:cNvPr>
+          <p:cNvPicPr>
+            <a:picLocks noChangeAspect="1"/>
+          </p:cNvPicPr>
+          <p:nvPr/>
+        </p:nvPicPr>
+        <p:blipFill>
+          <a:blip r:embed="rId3"/>
+          <a:stretch>
+            <a:fillRect/>
+          </a:stretch>
+        </p:blipFill>
+        <p:spPr>
+          <a:xfrm>
+            <a:off x="5395464" y="2206229"/>
+            <a:ext cx="5242204" cy="759384"/>
+          </a:xfrm>
+          <a:prstGeom prst="rect">
+            <a:avLst/>
+          </a:prstGeom>
+        </p:spPr>
+      </p:pic>
     </p:spTree>
     <p:extLst>
       <p:ext uri="{BB962C8B-B14F-4D97-AF65-F5344CB8AC3E}">
         <p14:creationId xmlns:p14="http://schemas.microsoft.com/office/powerpoint/2010/main" val="189725039"/>
+      </p:ext>
+    </p:extLst>
+  </p:cSld>
+  <p:clrMapOvr>
+    <a:masterClrMapping/>
+  </p:clrMapOvr>
+</p:sld>
+</file>
+
+<file path=ppt/slides/slide18.xml><?xml version="1.0" encoding="utf-8"?>
+<p:sld xmlns:a="http://schemas.openxmlformats.org/drawingml/2006/main" xmlns:r="http://schemas.openxmlformats.org/officeDocument/2006/relationships" xmlns:p="http://schemas.openxmlformats.org/presentationml/2006/main">
+  <p:cSld>
+    <p:spTree>
+      <p:nvGrpSpPr>
+        <p:cNvPr id="1" name=""/>
+        <p:cNvGrpSpPr/>
+        <p:nvPr/>
+      </p:nvGrpSpPr>
+      <p:grpSpPr>
+        <a:xfrm>
+          <a:off x="0" y="0"/>
+          <a:ext cx="0" cy="0"/>
+          <a:chOff x="0" y="0"/>
+          <a:chExt cx="0" cy="0"/>
+        </a:xfrm>
+      </p:grpSpPr>
+      <p:pic>
+        <p:nvPicPr>
+          <p:cNvPr id="8" name="Picture 7">
+            <a:extLst>
+              <a:ext uri="{FF2B5EF4-FFF2-40B4-BE49-F238E27FC236}">
+                <a16:creationId xmlns:a16="http://schemas.microsoft.com/office/drawing/2014/main" id="{3D50C6B0-24ED-45B1-A493-6219AB87B619}"/>
+              </a:ext>
+            </a:extLst>
+          </p:cNvPr>
+          <p:cNvPicPr>
+            <a:picLocks noChangeAspect="1"/>
+          </p:cNvPicPr>
+          <p:nvPr/>
+        </p:nvPicPr>
+        <p:blipFill>
+          <a:blip r:embed="rId2"/>
+          <a:stretch>
+            <a:fillRect/>
+          </a:stretch>
+        </p:blipFill>
+        <p:spPr>
+          <a:xfrm>
+            <a:off x="310393" y="3174418"/>
+            <a:ext cx="8997248" cy="3606274"/>
+          </a:xfrm>
+          <a:prstGeom prst="rect">
+            <a:avLst/>
+          </a:prstGeom>
+        </p:spPr>
+      </p:pic>
+      <p:sp>
+        <p:nvSpPr>
+          <p:cNvPr id="4" name="Rectangle 3">
+            <a:extLst>
+              <a:ext uri="{FF2B5EF4-FFF2-40B4-BE49-F238E27FC236}">
+                <a16:creationId xmlns:a16="http://schemas.microsoft.com/office/drawing/2014/main" id="{2058D325-366B-47E5-934D-FC405F65C783}"/>
+              </a:ext>
+            </a:extLst>
+          </p:cNvPr>
+          <p:cNvSpPr/>
+          <p:nvPr/>
+        </p:nvSpPr>
+        <p:spPr>
+          <a:xfrm>
+            <a:off x="1529884" y="234049"/>
+            <a:ext cx="9294980" cy="1323439"/>
+          </a:xfrm>
+          <a:prstGeom prst="rect">
+            <a:avLst/>
+          </a:prstGeom>
+          <a:noFill/>
+        </p:spPr>
+        <p:txBody>
+          <a:bodyPr wrap="none" lIns="91440" tIns="45720" rIns="91440" bIns="45720">
+            <a:spAutoFit/>
+          </a:bodyPr>
+          <a:lstStyle/>
+          <a:p>
+            <a:pPr algn="ctr"/>
+            <a:r>
+              <a:rPr lang="en-US" sz="8000" b="1" dirty="0">
+                <a:ln w="9525">
+                  <a:solidFill>
+                    <a:schemeClr val="bg1"/>
+                  </a:solidFill>
+                  <a:prstDash val="solid"/>
+                </a:ln>
+                <a:effectLst>
+                  <a:outerShdw blurRad="12700" dist="38100" dir="2700000" algn="tl" rotWithShape="0">
+                    <a:schemeClr val="bg1">
+                      <a:lumMod val="50000"/>
+                    </a:schemeClr>
+                  </a:outerShdw>
+                </a:effectLst>
+              </a:rPr>
+              <a:t>Discriminated Unions</a:t>
+            </a:r>
+            <a:endParaRPr lang="en-US" sz="8000" b="1" cap="none" spc="0" dirty="0">
+              <a:ln w="9525">
+                <a:solidFill>
+                  <a:schemeClr val="bg1"/>
+                </a:solidFill>
+                <a:prstDash val="solid"/>
+              </a:ln>
+              <a:solidFill>
+                <a:schemeClr val="tx1"/>
+              </a:solidFill>
+              <a:effectLst>
+                <a:outerShdw blurRad="12700" dist="38100" dir="2700000" algn="tl" rotWithShape="0">
+                  <a:schemeClr val="bg1">
+                    <a:lumMod val="50000"/>
+                  </a:schemeClr>
+                </a:outerShdw>
+              </a:effectLst>
+            </a:endParaRPr>
+          </a:p>
+        </p:txBody>
+      </p:sp>
+      <p:sp>
+        <p:nvSpPr>
+          <p:cNvPr id="5" name="Content Placeholder 2">
+            <a:extLst>
+              <a:ext uri="{FF2B5EF4-FFF2-40B4-BE49-F238E27FC236}">
+                <a16:creationId xmlns:a16="http://schemas.microsoft.com/office/drawing/2014/main" id="{93B4D857-0A6D-4657-913A-56C62D4776A0}"/>
+              </a:ext>
+            </a:extLst>
+          </p:cNvPr>
+          <p:cNvSpPr>
+            <a:spLocks noGrp="1"/>
+          </p:cNvSpPr>
+          <p:nvPr>
+            <p:ph idx="1"/>
+          </p:nvPr>
+        </p:nvSpPr>
+        <p:spPr>
+          <a:xfrm>
+            <a:off x="-729574" y="1625863"/>
+            <a:ext cx="5126476" cy="3606274"/>
+          </a:xfrm>
+        </p:spPr>
+        <p:txBody>
+          <a:bodyPr>
+            <a:noAutofit/>
+          </a:bodyPr>
+          <a:lstStyle/>
+          <a:p>
+            <a:pPr lvl="2"/>
+            <a:r>
+              <a:rPr lang="en-GB" sz="3200" dirty="0"/>
+              <a:t>If we don’t provide a type, DU’s don’t play so well. </a:t>
+            </a:r>
+          </a:p>
+        </p:txBody>
+      </p:sp>
+      <p:pic>
+        <p:nvPicPr>
+          <p:cNvPr id="6" name="Picture 5">
+            <a:extLst>
+              <a:ext uri="{FF2B5EF4-FFF2-40B4-BE49-F238E27FC236}">
+                <a16:creationId xmlns:a16="http://schemas.microsoft.com/office/drawing/2014/main" id="{EAF1BFE2-D1F8-4731-BD60-321112601C11}"/>
+              </a:ext>
+            </a:extLst>
+          </p:cNvPr>
+          <p:cNvPicPr>
+            <a:picLocks noChangeAspect="1"/>
+          </p:cNvPicPr>
+          <p:nvPr/>
+        </p:nvPicPr>
+        <p:blipFill>
+          <a:blip r:embed="rId3"/>
+          <a:stretch>
+            <a:fillRect/>
+          </a:stretch>
+        </p:blipFill>
+        <p:spPr>
+          <a:xfrm>
+            <a:off x="4614432" y="1625863"/>
+            <a:ext cx="2130317" cy="962079"/>
+          </a:xfrm>
+          <a:prstGeom prst="rect">
+            <a:avLst/>
+          </a:prstGeom>
+        </p:spPr>
+      </p:pic>
+      <p:pic>
+        <p:nvPicPr>
+          <p:cNvPr id="7" name="Picture 6">
+            <a:extLst>
+              <a:ext uri="{FF2B5EF4-FFF2-40B4-BE49-F238E27FC236}">
+                <a16:creationId xmlns:a16="http://schemas.microsoft.com/office/drawing/2014/main" id="{39928E91-B5DB-4CAD-A796-B497DA41C477}"/>
+              </a:ext>
+            </a:extLst>
+          </p:cNvPr>
+          <p:cNvPicPr>
+            <a:picLocks noChangeAspect="1"/>
+          </p:cNvPicPr>
+          <p:nvPr/>
+        </p:nvPicPr>
+        <p:blipFill>
+          <a:blip r:embed="rId4"/>
+          <a:stretch>
+            <a:fillRect/>
+          </a:stretch>
+        </p:blipFill>
+        <p:spPr>
+          <a:xfrm>
+            <a:off x="7991276" y="1398357"/>
+            <a:ext cx="3293118" cy="2379169"/>
+          </a:xfrm>
+          <a:prstGeom prst="rect">
+            <a:avLst/>
+          </a:prstGeom>
+        </p:spPr>
+      </p:pic>
+    </p:spTree>
+    <p:extLst>
+      <p:ext uri="{BB962C8B-B14F-4D97-AF65-F5344CB8AC3E}">
+        <p14:creationId xmlns:p14="http://schemas.microsoft.com/office/powerpoint/2010/main" val="2331310837"/>
+      </p:ext>
+    </p:extLst>
+  </p:cSld>
+  <p:clrMapOvr>
+    <a:masterClrMapping/>
+  </p:clrMapOvr>
+</p:sld>
+</file>
+
+<file path=ppt/slides/slide19.xml><?xml version="1.0" encoding="utf-8"?>
+<p:sld xmlns:a="http://schemas.openxmlformats.org/drawingml/2006/main" xmlns:r="http://schemas.openxmlformats.org/officeDocument/2006/relationships" xmlns:p="http://schemas.openxmlformats.org/presentationml/2006/main">
+  <p:cSld>
+    <p:spTree>
+      <p:nvGrpSpPr>
+        <p:cNvPr id="1" name=""/>
+        <p:cNvGrpSpPr/>
+        <p:nvPr/>
+      </p:nvGrpSpPr>
+      <p:grpSpPr>
+        <a:xfrm>
+          <a:off x="0" y="0"/>
+          <a:ext cx="0" cy="0"/>
+          <a:chOff x="0" y="0"/>
+          <a:chExt cx="0" cy="0"/>
+        </a:xfrm>
+      </p:grpSpPr>
+      <p:sp>
+        <p:nvSpPr>
+          <p:cNvPr id="4" name="Rectangle 3">
+            <a:extLst>
+              <a:ext uri="{FF2B5EF4-FFF2-40B4-BE49-F238E27FC236}">
+                <a16:creationId xmlns:a16="http://schemas.microsoft.com/office/drawing/2014/main" id="{2058D325-366B-47E5-934D-FC405F65C783}"/>
+              </a:ext>
+            </a:extLst>
+          </p:cNvPr>
+          <p:cNvSpPr/>
+          <p:nvPr/>
+        </p:nvSpPr>
+        <p:spPr>
+          <a:xfrm>
+            <a:off x="4406308" y="234049"/>
+            <a:ext cx="3542124" cy="1323439"/>
+          </a:xfrm>
+          <a:prstGeom prst="rect">
+            <a:avLst/>
+          </a:prstGeom>
+          <a:noFill/>
+        </p:spPr>
+        <p:txBody>
+          <a:bodyPr wrap="none" lIns="91440" tIns="45720" rIns="91440" bIns="45720">
+            <a:spAutoFit/>
+          </a:bodyPr>
+          <a:lstStyle/>
+          <a:p>
+            <a:pPr algn="ctr"/>
+            <a:r>
+              <a:rPr lang="en-US" sz="8000" b="1" dirty="0">
+                <a:ln w="9525">
+                  <a:solidFill>
+                    <a:schemeClr val="bg1"/>
+                  </a:solidFill>
+                  <a:prstDash val="solid"/>
+                </a:ln>
+                <a:effectLst>
+                  <a:outerShdw blurRad="12700" dist="38100" dir="2700000" algn="tl" rotWithShape="0">
+                    <a:schemeClr val="bg1">
+                      <a:lumMod val="50000"/>
+                    </a:schemeClr>
+                  </a:outerShdw>
+                </a:effectLst>
+              </a:rPr>
+              <a:t>Options</a:t>
+            </a:r>
+            <a:endParaRPr lang="en-US" sz="8000" b="1" cap="none" spc="0" dirty="0">
+              <a:ln w="9525">
+                <a:solidFill>
+                  <a:schemeClr val="bg1"/>
+                </a:solidFill>
+                <a:prstDash val="solid"/>
+              </a:ln>
+              <a:solidFill>
+                <a:schemeClr val="tx1"/>
+              </a:solidFill>
+              <a:effectLst>
+                <a:outerShdw blurRad="12700" dist="38100" dir="2700000" algn="tl" rotWithShape="0">
+                  <a:schemeClr val="bg1">
+                    <a:lumMod val="50000"/>
+                  </a:schemeClr>
+                </a:outerShdw>
+              </a:effectLst>
+            </a:endParaRPr>
+          </a:p>
+        </p:txBody>
+      </p:sp>
+      <p:sp>
+        <p:nvSpPr>
+          <p:cNvPr id="5" name="Content Placeholder 2">
+            <a:extLst>
+              <a:ext uri="{FF2B5EF4-FFF2-40B4-BE49-F238E27FC236}">
+                <a16:creationId xmlns:a16="http://schemas.microsoft.com/office/drawing/2014/main" id="{93B4D857-0A6D-4657-913A-56C62D4776A0}"/>
+              </a:ext>
+            </a:extLst>
+          </p:cNvPr>
+          <p:cNvSpPr>
+            <a:spLocks noGrp="1"/>
+          </p:cNvSpPr>
+          <p:nvPr>
+            <p:ph idx="1"/>
+          </p:nvPr>
+        </p:nvSpPr>
+        <p:spPr>
+          <a:xfrm>
+            <a:off x="-729574" y="1625863"/>
+            <a:ext cx="5126476" cy="3606274"/>
+          </a:xfrm>
+        </p:spPr>
+        <p:txBody>
+          <a:bodyPr>
+            <a:noAutofit/>
+          </a:bodyPr>
+          <a:lstStyle/>
+          <a:p>
+            <a:pPr lvl="2"/>
+            <a:r>
+              <a:rPr lang="en-GB" sz="3200" dirty="0"/>
+              <a:t>Options allow you to get the value and work as expected. </a:t>
+            </a:r>
+          </a:p>
+          <a:p>
+            <a:pPr lvl="2"/>
+            <a:r>
+              <a:rPr lang="en-GB" sz="3200" dirty="0"/>
+              <a:t>None simply returns as null therefore making it unsafe</a:t>
+            </a:r>
+          </a:p>
+        </p:txBody>
+      </p:sp>
+      <p:pic>
+        <p:nvPicPr>
+          <p:cNvPr id="10" name="Picture 9">
+            <a:extLst>
+              <a:ext uri="{FF2B5EF4-FFF2-40B4-BE49-F238E27FC236}">
+                <a16:creationId xmlns:a16="http://schemas.microsoft.com/office/drawing/2014/main" id="{6449619A-49C6-4517-93CC-604BB1CC9442}"/>
+              </a:ext>
+            </a:extLst>
+          </p:cNvPr>
+          <p:cNvPicPr>
+            <a:picLocks noChangeAspect="1"/>
+          </p:cNvPicPr>
+          <p:nvPr/>
+        </p:nvPicPr>
+        <p:blipFill>
+          <a:blip r:embed="rId2"/>
+          <a:stretch>
+            <a:fillRect/>
+          </a:stretch>
+        </p:blipFill>
+        <p:spPr>
+          <a:xfrm>
+            <a:off x="5736087" y="1625863"/>
+            <a:ext cx="3991532" cy="790685"/>
+          </a:xfrm>
+          <a:prstGeom prst="rect">
+            <a:avLst/>
+          </a:prstGeom>
+        </p:spPr>
+      </p:pic>
+      <p:pic>
+        <p:nvPicPr>
+          <p:cNvPr id="11" name="Picture 10">
+            <a:extLst>
+              <a:ext uri="{FF2B5EF4-FFF2-40B4-BE49-F238E27FC236}">
+                <a16:creationId xmlns:a16="http://schemas.microsoft.com/office/drawing/2014/main" id="{94952F5D-92D6-4BB3-A51F-D15690556930}"/>
+              </a:ext>
+            </a:extLst>
+          </p:cNvPr>
+          <p:cNvPicPr>
+            <a:picLocks noChangeAspect="1"/>
+          </p:cNvPicPr>
+          <p:nvPr/>
+        </p:nvPicPr>
+        <p:blipFill>
+          <a:blip r:embed="rId3"/>
+          <a:stretch>
+            <a:fillRect/>
+          </a:stretch>
+        </p:blipFill>
+        <p:spPr>
+          <a:xfrm>
+            <a:off x="5202612" y="2857420"/>
+            <a:ext cx="5058481" cy="1143160"/>
+          </a:xfrm>
+          <a:prstGeom prst="rect">
+            <a:avLst/>
+          </a:prstGeom>
+        </p:spPr>
+      </p:pic>
+      <p:pic>
+        <p:nvPicPr>
+          <p:cNvPr id="12" name="Picture 11">
+            <a:extLst>
+              <a:ext uri="{FF2B5EF4-FFF2-40B4-BE49-F238E27FC236}">
+                <a16:creationId xmlns:a16="http://schemas.microsoft.com/office/drawing/2014/main" id="{40AED28F-66BE-4A3F-95F8-CBAB0841C596}"/>
+              </a:ext>
+            </a:extLst>
+          </p:cNvPr>
+          <p:cNvPicPr>
+            <a:picLocks noChangeAspect="1"/>
+          </p:cNvPicPr>
+          <p:nvPr/>
+        </p:nvPicPr>
+        <p:blipFill>
+          <a:blip r:embed="rId4"/>
+          <a:stretch>
+            <a:fillRect/>
+          </a:stretch>
+        </p:blipFill>
+        <p:spPr>
+          <a:xfrm>
+            <a:off x="4935154" y="4878521"/>
+            <a:ext cx="5719892" cy="707232"/>
+          </a:xfrm>
+          <a:prstGeom prst="rect">
+            <a:avLst/>
+          </a:prstGeom>
+        </p:spPr>
+      </p:pic>
+    </p:spTree>
+    <p:extLst>
+      <p:ext uri="{BB962C8B-B14F-4D97-AF65-F5344CB8AC3E}">
+        <p14:creationId xmlns:p14="http://schemas.microsoft.com/office/powerpoint/2010/main" val="2084024489"/>
       </p:ext>
     </p:extLst>
   </p:cSld>
@@ -5511,6 +5971,648 @@
     <p:extLst>
       <p:ext uri="{BB962C8B-B14F-4D97-AF65-F5344CB8AC3E}">
         <p14:creationId xmlns:p14="http://schemas.microsoft.com/office/powerpoint/2010/main" val="2349744765"/>
+      </p:ext>
+    </p:extLst>
+  </p:cSld>
+  <p:clrMapOvr>
+    <a:masterClrMapping/>
+  </p:clrMapOvr>
+</p:sld>
+</file>
+
+<file path=ppt/slides/slide20.xml><?xml version="1.0" encoding="utf-8"?>
+<p:sld xmlns:a="http://schemas.openxmlformats.org/drawingml/2006/main" xmlns:r="http://schemas.openxmlformats.org/officeDocument/2006/relationships" xmlns:p="http://schemas.openxmlformats.org/presentationml/2006/main">
+  <p:cSld>
+    <p:spTree>
+      <p:nvGrpSpPr>
+        <p:cNvPr id="1" name=""/>
+        <p:cNvGrpSpPr/>
+        <p:nvPr/>
+      </p:nvGrpSpPr>
+      <p:grpSpPr>
+        <a:xfrm>
+          <a:off x="0" y="0"/>
+          <a:ext cx="0" cy="0"/>
+          <a:chOff x="0" y="0"/>
+          <a:chExt cx="0" cy="0"/>
+        </a:xfrm>
+      </p:grpSpPr>
+      <p:sp>
+        <p:nvSpPr>
+          <p:cNvPr id="4" name="Rectangle 3">
+            <a:extLst>
+              <a:ext uri="{FF2B5EF4-FFF2-40B4-BE49-F238E27FC236}">
+                <a16:creationId xmlns:a16="http://schemas.microsoft.com/office/drawing/2014/main" id="{2058D325-366B-47E5-934D-FC405F65C783}"/>
+              </a:ext>
+            </a:extLst>
+          </p:cNvPr>
+          <p:cNvSpPr/>
+          <p:nvPr/>
+        </p:nvSpPr>
+        <p:spPr>
+          <a:xfrm>
+            <a:off x="2267839" y="2151727"/>
+            <a:ext cx="7208669" cy="2554545"/>
+          </a:xfrm>
+          <a:prstGeom prst="rect">
+            <a:avLst/>
+          </a:prstGeom>
+          <a:noFill/>
+        </p:spPr>
+        <p:txBody>
+          <a:bodyPr wrap="square" lIns="91440" tIns="45720" rIns="91440" bIns="45720">
+            <a:spAutoFit/>
+          </a:bodyPr>
+          <a:lstStyle/>
+          <a:p>
+            <a:pPr algn="ctr"/>
+            <a:r>
+              <a:rPr lang="en-US" sz="8000" b="1" cap="none" spc="0" dirty="0">
+                <a:ln w="9525">
+                  <a:solidFill>
+                    <a:schemeClr val="bg1"/>
+                  </a:solidFill>
+                  <a:prstDash val="solid"/>
+                </a:ln>
+                <a:solidFill>
+                  <a:schemeClr val="tx1"/>
+                </a:solidFill>
+                <a:effectLst>
+                  <a:outerShdw blurRad="12700" dist="38100" dir="2700000" algn="tl" rotWithShape="0">
+                    <a:schemeClr val="bg1">
+                      <a:lumMod val="50000"/>
+                    </a:schemeClr>
+                  </a:outerShdw>
+                </a:effectLst>
+              </a:rPr>
+              <a:t>Things that should work</a:t>
+            </a:r>
+          </a:p>
+        </p:txBody>
+      </p:sp>
+    </p:spTree>
+    <p:extLst>
+      <p:ext uri="{BB962C8B-B14F-4D97-AF65-F5344CB8AC3E}">
+        <p14:creationId xmlns:p14="http://schemas.microsoft.com/office/powerpoint/2010/main" val="1406536085"/>
+      </p:ext>
+    </p:extLst>
+  </p:cSld>
+  <p:clrMapOvr>
+    <a:masterClrMapping/>
+  </p:clrMapOvr>
+</p:sld>
+</file>
+
+<file path=ppt/slides/slide21.xml><?xml version="1.0" encoding="utf-8"?>
+<p:sld xmlns:a="http://schemas.openxmlformats.org/drawingml/2006/main" xmlns:r="http://schemas.openxmlformats.org/officeDocument/2006/relationships" xmlns:p="http://schemas.openxmlformats.org/presentationml/2006/main">
+  <p:cSld>
+    <p:spTree>
+      <p:nvGrpSpPr>
+        <p:cNvPr id="1" name=""/>
+        <p:cNvGrpSpPr/>
+        <p:nvPr/>
+      </p:nvGrpSpPr>
+      <p:grpSpPr>
+        <a:xfrm>
+          <a:off x="0" y="0"/>
+          <a:ext cx="0" cy="0"/>
+          <a:chOff x="0" y="0"/>
+          <a:chExt cx="0" cy="0"/>
+        </a:xfrm>
+      </p:grpSpPr>
+      <p:sp>
+        <p:nvSpPr>
+          <p:cNvPr id="4" name="Rectangle 3">
+            <a:extLst>
+              <a:ext uri="{FF2B5EF4-FFF2-40B4-BE49-F238E27FC236}">
+                <a16:creationId xmlns:a16="http://schemas.microsoft.com/office/drawing/2014/main" id="{2058D325-366B-47E5-934D-FC405F65C783}"/>
+              </a:ext>
+            </a:extLst>
+          </p:cNvPr>
+          <p:cNvSpPr/>
+          <p:nvPr/>
+        </p:nvSpPr>
+        <p:spPr>
+          <a:xfrm>
+            <a:off x="4025981" y="234049"/>
+            <a:ext cx="4302781" cy="1323439"/>
+          </a:xfrm>
+          <a:prstGeom prst="rect">
+            <a:avLst/>
+          </a:prstGeom>
+          <a:noFill/>
+        </p:spPr>
+        <p:txBody>
+          <a:bodyPr wrap="none" lIns="91440" tIns="45720" rIns="91440" bIns="45720">
+            <a:spAutoFit/>
+          </a:bodyPr>
+          <a:lstStyle/>
+          <a:p>
+            <a:pPr algn="ctr"/>
+            <a:r>
+              <a:rPr lang="en-US" sz="8000" b="1" dirty="0">
+                <a:ln w="9525">
+                  <a:solidFill>
+                    <a:schemeClr val="bg1"/>
+                  </a:solidFill>
+                  <a:prstDash val="solid"/>
+                </a:ln>
+                <a:effectLst>
+                  <a:outerShdw blurRad="12700" dist="38100" dir="2700000" algn="tl" rotWithShape="0">
+                    <a:schemeClr val="bg1">
+                      <a:lumMod val="50000"/>
+                    </a:schemeClr>
+                  </a:outerShdw>
+                </a:effectLst>
+              </a:rPr>
+              <a:t>Functions</a:t>
+            </a:r>
+            <a:endParaRPr lang="en-US" sz="8000" b="1" cap="none" spc="0" dirty="0">
+              <a:ln w="9525">
+                <a:solidFill>
+                  <a:schemeClr val="bg1"/>
+                </a:solidFill>
+                <a:prstDash val="solid"/>
+              </a:ln>
+              <a:solidFill>
+                <a:schemeClr val="tx1"/>
+              </a:solidFill>
+              <a:effectLst>
+                <a:outerShdw blurRad="12700" dist="38100" dir="2700000" algn="tl" rotWithShape="0">
+                  <a:schemeClr val="bg1">
+                    <a:lumMod val="50000"/>
+                  </a:schemeClr>
+                </a:outerShdw>
+              </a:effectLst>
+            </a:endParaRPr>
+          </a:p>
+        </p:txBody>
+      </p:sp>
+      <p:sp>
+        <p:nvSpPr>
+          <p:cNvPr id="5" name="Content Placeholder 2">
+            <a:extLst>
+              <a:ext uri="{FF2B5EF4-FFF2-40B4-BE49-F238E27FC236}">
+                <a16:creationId xmlns:a16="http://schemas.microsoft.com/office/drawing/2014/main" id="{93B4D857-0A6D-4657-913A-56C62D4776A0}"/>
+              </a:ext>
+            </a:extLst>
+          </p:cNvPr>
+          <p:cNvSpPr>
+            <a:spLocks noGrp="1"/>
+          </p:cNvSpPr>
+          <p:nvPr>
+            <p:ph idx="1"/>
+          </p:nvPr>
+        </p:nvSpPr>
+        <p:spPr>
+          <a:xfrm>
+            <a:off x="56060" y="1474861"/>
+            <a:ext cx="12079879" cy="3606274"/>
+          </a:xfrm>
+        </p:spPr>
+        <p:txBody>
+          <a:bodyPr>
+            <a:noAutofit/>
+          </a:bodyPr>
+          <a:lstStyle/>
+          <a:p>
+            <a:pPr lvl="2"/>
+            <a:r>
+              <a:rPr lang="en-GB" sz="3200" dirty="0"/>
+              <a:t>If a function takes another function, we have problems.</a:t>
+            </a:r>
+          </a:p>
+        </p:txBody>
+      </p:sp>
+      <p:pic>
+        <p:nvPicPr>
+          <p:cNvPr id="2" name="Picture 1">
+            <a:extLst>
+              <a:ext uri="{FF2B5EF4-FFF2-40B4-BE49-F238E27FC236}">
+                <a16:creationId xmlns:a16="http://schemas.microsoft.com/office/drawing/2014/main" id="{4B12C3D0-84DD-4FF2-9304-D78399739978}"/>
+              </a:ext>
+            </a:extLst>
+          </p:cNvPr>
+          <p:cNvPicPr>
+            <a:picLocks noChangeAspect="1"/>
+          </p:cNvPicPr>
+          <p:nvPr/>
+        </p:nvPicPr>
+        <p:blipFill>
+          <a:blip r:embed="rId2"/>
+          <a:stretch>
+            <a:fillRect/>
+          </a:stretch>
+        </p:blipFill>
+        <p:spPr>
+          <a:xfrm>
+            <a:off x="3459858" y="2258965"/>
+            <a:ext cx="5272283" cy="755754"/>
+          </a:xfrm>
+          <a:prstGeom prst="rect">
+            <a:avLst/>
+          </a:prstGeom>
+        </p:spPr>
+      </p:pic>
+      <p:pic>
+        <p:nvPicPr>
+          <p:cNvPr id="3" name="Picture 2">
+            <a:extLst>
+              <a:ext uri="{FF2B5EF4-FFF2-40B4-BE49-F238E27FC236}">
+                <a16:creationId xmlns:a16="http://schemas.microsoft.com/office/drawing/2014/main" id="{41C816C2-66CD-42DB-98F4-30286669C49D}"/>
+              </a:ext>
+            </a:extLst>
+          </p:cNvPr>
+          <p:cNvPicPr>
+            <a:picLocks noChangeAspect="1"/>
+          </p:cNvPicPr>
+          <p:nvPr/>
+        </p:nvPicPr>
+        <p:blipFill>
+          <a:blip r:embed="rId3"/>
+          <a:stretch>
+            <a:fillRect/>
+          </a:stretch>
+        </p:blipFill>
+        <p:spPr>
+          <a:xfrm>
+            <a:off x="1625652" y="3843281"/>
+            <a:ext cx="8940695" cy="454909"/>
+          </a:xfrm>
+          <a:prstGeom prst="rect">
+            <a:avLst/>
+          </a:prstGeom>
+        </p:spPr>
+      </p:pic>
+      <p:pic>
+        <p:nvPicPr>
+          <p:cNvPr id="6" name="Picture 5">
+            <a:extLst>
+              <a:ext uri="{FF2B5EF4-FFF2-40B4-BE49-F238E27FC236}">
+                <a16:creationId xmlns:a16="http://schemas.microsoft.com/office/drawing/2014/main" id="{FACBDA95-A5DC-44EF-9707-4FC5DCBBAD3D}"/>
+              </a:ext>
+            </a:extLst>
+          </p:cNvPr>
+          <p:cNvPicPr>
+            <a:picLocks noChangeAspect="1"/>
+          </p:cNvPicPr>
+          <p:nvPr/>
+        </p:nvPicPr>
+        <p:blipFill>
+          <a:blip r:embed="rId4"/>
+          <a:stretch>
+            <a:fillRect/>
+          </a:stretch>
+        </p:blipFill>
+        <p:spPr>
+          <a:xfrm>
+            <a:off x="68980" y="4702474"/>
+            <a:ext cx="12054037" cy="378661"/>
+          </a:xfrm>
+          <a:prstGeom prst="rect">
+            <a:avLst/>
+          </a:prstGeom>
+        </p:spPr>
+      </p:pic>
+    </p:spTree>
+    <p:extLst>
+      <p:ext uri="{BB962C8B-B14F-4D97-AF65-F5344CB8AC3E}">
+        <p14:creationId xmlns:p14="http://schemas.microsoft.com/office/powerpoint/2010/main" val="197899440"/>
+      </p:ext>
+    </p:extLst>
+  </p:cSld>
+  <p:clrMapOvr>
+    <a:masterClrMapping/>
+  </p:clrMapOvr>
+  <p:timing>
+    <p:tnLst>
+      <p:par>
+        <p:cTn id="1" dur="indefinite" restart="never" nodeType="tmRoot">
+          <p:childTnLst>
+            <p:seq concurrent="1" nextAc="seek">
+              <p:cTn id="2" dur="indefinite" nodeType="mainSeq">
+                <p:childTnLst>
+                  <p:par>
+                    <p:cTn id="3" fill="hold">
+                      <p:stCondLst>
+                        <p:cond delay="indefinite"/>
+                      </p:stCondLst>
+                      <p:childTnLst>
+                        <p:par>
+                          <p:cTn id="4" fill="hold">
+                            <p:stCondLst>
+                              <p:cond delay="0"/>
+                            </p:stCondLst>
+                            <p:childTnLst>
+                              <p:par>
+                                <p:cTn id="5" presetID="1" presetClass="entr" presetSubtype="0" fill="hold" nodeType="clickEffect">
+                                  <p:stCondLst>
+                                    <p:cond delay="0"/>
+                                  </p:stCondLst>
+                                  <p:childTnLst>
+                                    <p:set>
+                                      <p:cBhvr>
+                                        <p:cTn id="6" dur="1" fill="hold">
+                                          <p:stCondLst>
+                                            <p:cond delay="0"/>
+                                          </p:stCondLst>
+                                        </p:cTn>
+                                        <p:tgtEl>
+                                          <p:spTgt spid="2"/>
+                                        </p:tgtEl>
+                                        <p:attrNameLst>
+                                          <p:attrName>style.visibility</p:attrName>
+                                        </p:attrNameLst>
+                                      </p:cBhvr>
+                                      <p:to>
+                                        <p:strVal val="visible"/>
+                                      </p:to>
+                                    </p:set>
+                                  </p:childTnLst>
+                                </p:cTn>
+                              </p:par>
+                            </p:childTnLst>
+                          </p:cTn>
+                        </p:par>
+                      </p:childTnLst>
+                    </p:cTn>
+                  </p:par>
+                  <p:par>
+                    <p:cTn id="7" fill="hold">
+                      <p:stCondLst>
+                        <p:cond delay="indefinite"/>
+                      </p:stCondLst>
+                      <p:childTnLst>
+                        <p:par>
+                          <p:cTn id="8" fill="hold">
+                            <p:stCondLst>
+                              <p:cond delay="0"/>
+                            </p:stCondLst>
+                            <p:childTnLst>
+                              <p:par>
+                                <p:cTn id="9" presetID="1" presetClass="entr" presetSubtype="0" fill="hold" nodeType="clickEffect">
+                                  <p:stCondLst>
+                                    <p:cond delay="0"/>
+                                  </p:stCondLst>
+                                  <p:childTnLst>
+                                    <p:set>
+                                      <p:cBhvr>
+                                        <p:cTn id="10" dur="1" fill="hold">
+                                          <p:stCondLst>
+                                            <p:cond delay="0"/>
+                                          </p:stCondLst>
+                                        </p:cTn>
+                                        <p:tgtEl>
+                                          <p:spTgt spid="3"/>
+                                        </p:tgtEl>
+                                        <p:attrNameLst>
+                                          <p:attrName>style.visibility</p:attrName>
+                                        </p:attrNameLst>
+                                      </p:cBhvr>
+                                      <p:to>
+                                        <p:strVal val="visible"/>
+                                      </p:to>
+                                    </p:set>
+                                  </p:childTnLst>
+                                </p:cTn>
+                              </p:par>
+                            </p:childTnLst>
+                          </p:cTn>
+                        </p:par>
+                      </p:childTnLst>
+                    </p:cTn>
+                  </p:par>
+                  <p:par>
+                    <p:cTn id="11" fill="hold">
+                      <p:stCondLst>
+                        <p:cond delay="indefinite"/>
+                      </p:stCondLst>
+                      <p:childTnLst>
+                        <p:par>
+                          <p:cTn id="12" fill="hold">
+                            <p:stCondLst>
+                              <p:cond delay="0"/>
+                            </p:stCondLst>
+                            <p:childTnLst>
+                              <p:par>
+                                <p:cTn id="13" presetID="1" presetClass="entr" presetSubtype="0" fill="hold" nodeType="clickEffect">
+                                  <p:stCondLst>
+                                    <p:cond delay="0"/>
+                                  </p:stCondLst>
+                                  <p:childTnLst>
+                                    <p:set>
+                                      <p:cBhvr>
+                                        <p:cTn id="14" dur="1" fill="hold">
+                                          <p:stCondLst>
+                                            <p:cond delay="0"/>
+                                          </p:stCondLst>
+                                        </p:cTn>
+                                        <p:tgtEl>
+                                          <p:spTgt spid="6"/>
+                                        </p:tgtEl>
+                                        <p:attrNameLst>
+                                          <p:attrName>style.visibility</p:attrName>
+                                        </p:attrNameLst>
+                                      </p:cBhvr>
+                                      <p:to>
+                                        <p:strVal val="visible"/>
+                                      </p:to>
+                                    </p:set>
+                                  </p:childTnLst>
+                                </p:cTn>
+                              </p:par>
+                            </p:childTnLst>
+                          </p:cTn>
+                        </p:par>
+                      </p:childTnLst>
+                    </p:cTn>
+                  </p:par>
+                </p:childTnLst>
+              </p:cTn>
+              <p:prevCondLst>
+                <p:cond evt="onPrev" delay="0">
+                  <p:tgtEl>
+                    <p:sldTgt/>
+                  </p:tgtEl>
+                </p:cond>
+              </p:prevCondLst>
+              <p:nextCondLst>
+                <p:cond evt="onNext" delay="0">
+                  <p:tgtEl>
+                    <p:sldTgt/>
+                  </p:tgtEl>
+                </p:cond>
+              </p:nextCondLst>
+            </p:seq>
+          </p:childTnLst>
+        </p:cTn>
+      </p:par>
+    </p:tnLst>
+  </p:timing>
+</p:sld>
+</file>
+
+<file path=ppt/slides/slide22.xml><?xml version="1.0" encoding="utf-8"?>
+<p:sld xmlns:a="http://schemas.openxmlformats.org/drawingml/2006/main" xmlns:r="http://schemas.openxmlformats.org/officeDocument/2006/relationships" xmlns:p="http://schemas.openxmlformats.org/presentationml/2006/main">
+  <p:cSld>
+    <p:spTree>
+      <p:nvGrpSpPr>
+        <p:cNvPr id="1" name=""/>
+        <p:cNvGrpSpPr/>
+        <p:nvPr/>
+      </p:nvGrpSpPr>
+      <p:grpSpPr>
+        <a:xfrm>
+          <a:off x="0" y="0"/>
+          <a:ext cx="0" cy="0"/>
+          <a:chOff x="0" y="0"/>
+          <a:chExt cx="0" cy="0"/>
+        </a:xfrm>
+      </p:grpSpPr>
+      <p:sp>
+        <p:nvSpPr>
+          <p:cNvPr id="4" name="Rectangle 3">
+            <a:extLst>
+              <a:ext uri="{FF2B5EF4-FFF2-40B4-BE49-F238E27FC236}">
+                <a16:creationId xmlns:a16="http://schemas.microsoft.com/office/drawing/2014/main" id="{2058D325-366B-47E5-934D-FC405F65C783}"/>
+              </a:ext>
+            </a:extLst>
+          </p:cNvPr>
+          <p:cNvSpPr/>
+          <p:nvPr/>
+        </p:nvSpPr>
+        <p:spPr>
+          <a:xfrm>
+            <a:off x="3938172" y="234049"/>
+            <a:ext cx="4478405" cy="1323439"/>
+          </a:xfrm>
+          <a:prstGeom prst="rect">
+            <a:avLst/>
+          </a:prstGeom>
+          <a:noFill/>
+        </p:spPr>
+        <p:txBody>
+          <a:bodyPr wrap="none" lIns="91440" tIns="45720" rIns="91440" bIns="45720">
+            <a:spAutoFit/>
+          </a:bodyPr>
+          <a:lstStyle/>
+          <a:p>
+            <a:pPr algn="ctr"/>
+            <a:r>
+              <a:rPr lang="en-US" sz="8000" b="1" dirty="0">
+                <a:ln w="9525">
+                  <a:solidFill>
+                    <a:schemeClr val="bg1"/>
+                  </a:solidFill>
+                  <a:prstDash val="solid"/>
+                </a:ln>
+                <a:effectLst>
+                  <a:outerShdw blurRad="12700" dist="38100" dir="2700000" algn="tl" rotWithShape="0">
+                    <a:schemeClr val="bg1">
+                      <a:lumMod val="50000"/>
+                    </a:schemeClr>
+                  </a:outerShdw>
+                </a:effectLst>
+              </a:rPr>
+              <a:t>Resources</a:t>
+            </a:r>
+            <a:endParaRPr lang="en-US" sz="8000" b="1" cap="none" spc="0" dirty="0">
+              <a:ln w="9525">
+                <a:solidFill>
+                  <a:schemeClr val="bg1"/>
+                </a:solidFill>
+                <a:prstDash val="solid"/>
+              </a:ln>
+              <a:solidFill>
+                <a:schemeClr val="tx1"/>
+              </a:solidFill>
+              <a:effectLst>
+                <a:outerShdw blurRad="12700" dist="38100" dir="2700000" algn="tl" rotWithShape="0">
+                  <a:schemeClr val="bg1">
+                    <a:lumMod val="50000"/>
+                  </a:schemeClr>
+                </a:outerShdw>
+              </a:effectLst>
+            </a:endParaRPr>
+          </a:p>
+        </p:txBody>
+      </p:sp>
+      <p:sp>
+        <p:nvSpPr>
+          <p:cNvPr id="5" name="Content Placeholder 2">
+            <a:extLst>
+              <a:ext uri="{FF2B5EF4-FFF2-40B4-BE49-F238E27FC236}">
+                <a16:creationId xmlns:a16="http://schemas.microsoft.com/office/drawing/2014/main" id="{93B4D857-0A6D-4657-913A-56C62D4776A0}"/>
+              </a:ext>
+            </a:extLst>
+          </p:cNvPr>
+          <p:cNvSpPr>
+            <a:spLocks noGrp="1"/>
+          </p:cNvSpPr>
+          <p:nvPr>
+            <p:ph idx="1"/>
+          </p:nvPr>
+        </p:nvSpPr>
+        <p:spPr>
+          <a:xfrm>
+            <a:off x="56060" y="1474861"/>
+            <a:ext cx="12079879" cy="3606274"/>
+          </a:xfrm>
+        </p:spPr>
+        <p:txBody>
+          <a:bodyPr>
+            <a:noAutofit/>
+          </a:bodyPr>
+          <a:lstStyle/>
+          <a:p>
+            <a:pPr lvl="2"/>
+            <a:r>
+              <a:rPr lang="en-GB" sz="3200" dirty="0">
+                <a:hlinkClick r:id="rId2"/>
+              </a:rPr>
+              <a:t>https://parkeradam.home.blog/</a:t>
+            </a:r>
+          </a:p>
+          <a:p>
+            <a:pPr lvl="2"/>
+            <a:endParaRPr lang="en-GB" sz="3200" dirty="0">
+              <a:hlinkClick r:id="rId2"/>
+            </a:endParaRPr>
+          </a:p>
+          <a:p>
+            <a:pPr lvl="2"/>
+            <a:r>
+              <a:rPr lang="en-GB" sz="3200" dirty="0">
+                <a:hlinkClick r:id="rId2"/>
+              </a:rPr>
+              <a:t>https://connelhooley.uk/blog/2017/04/30/f-sharp-to-c-sharp#discriminated-unions</a:t>
+            </a:r>
+            <a:endParaRPr lang="en-GB" sz="3200" dirty="0"/>
+          </a:p>
+          <a:p>
+            <a:pPr lvl="2"/>
+            <a:endParaRPr lang="en-GB" sz="3200" dirty="0"/>
+          </a:p>
+          <a:p>
+            <a:pPr lvl="2"/>
+            <a:r>
+              <a:rPr lang="en-GB" sz="3200" dirty="0">
+                <a:hlinkClick r:id="rId3"/>
+              </a:rPr>
+              <a:t>https://sharplab.io</a:t>
+            </a:r>
+            <a:endParaRPr lang="en-GB" sz="3200" dirty="0"/>
+          </a:p>
+          <a:p>
+            <a:pPr lvl="2"/>
+            <a:endParaRPr lang="en-GB" sz="3200" dirty="0"/>
+          </a:p>
+        </p:txBody>
+      </p:sp>
+    </p:spTree>
+    <p:extLst>
+      <p:ext uri="{BB962C8B-B14F-4D97-AF65-F5344CB8AC3E}">
+        <p14:creationId xmlns:p14="http://schemas.microsoft.com/office/powerpoint/2010/main" val="3620129643"/>
       </p:ext>
     </p:extLst>
   </p:cSld>

</xml_diff>